<commit_message>
Cont: Android UI - ViewHolder + Adapter noch erklären
</commit_message>
<xml_diff>
--- a/Android_UI.pptx
+++ b/Android_UI.pptx
@@ -9,21 +9,20 @@
     <p:sldId id="256" r:id="rId3"/>
     <p:sldId id="268" r:id="rId4"/>
     <p:sldId id="257" r:id="rId5"/>
-    <p:sldId id="260" r:id="rId6"/>
-    <p:sldId id="258" r:id="rId7"/>
-    <p:sldId id="259" r:id="rId8"/>
-    <p:sldId id="273" r:id="rId9"/>
-    <p:sldId id="261" r:id="rId10"/>
-    <p:sldId id="271" r:id="rId11"/>
-    <p:sldId id="272" r:id="rId12"/>
-    <p:sldId id="266" r:id="rId13"/>
+    <p:sldId id="276" r:id="rId6"/>
+    <p:sldId id="260" r:id="rId7"/>
+    <p:sldId id="258" r:id="rId8"/>
+    <p:sldId id="259" r:id="rId9"/>
+    <p:sldId id="273" r:id="rId10"/>
+    <p:sldId id="261" r:id="rId11"/>
+    <p:sldId id="271" r:id="rId12"/>
+    <p:sldId id="272" r:id="rId13"/>
     <p:sldId id="263" r:id="rId14"/>
     <p:sldId id="267" r:id="rId15"/>
-    <p:sldId id="270" r:id="rId16"/>
-    <p:sldId id="269" r:id="rId17"/>
-    <p:sldId id="262" r:id="rId18"/>
-    <p:sldId id="274" r:id="rId19"/>
-    <p:sldId id="264" r:id="rId20"/>
+    <p:sldId id="269" r:id="rId16"/>
+    <p:sldId id="274" r:id="rId17"/>
+    <p:sldId id="277" r:id="rId18"/>
+    <p:sldId id="264" r:id="rId19"/>
   </p:sldIdLst>
   <p:sldSz cx="12192000" cy="6858000"/>
   <p:notesSz cx="6858000" cy="9144000"/>
@@ -279,7 +278,7 @@
           <a:p>
             <a:fld id="{919E3548-B54C-4660-A496-DDF0181B025A}" type="datetimeFigureOut">
               <a:rPr lang="de-DE" smtClean="0"/>
-              <a:t>31.10.2019</a:t>
+              <a:t>04.11.2019</a:t>
             </a:fld>
             <a:endParaRPr lang="de-DE"/>
           </a:p>
@@ -479,7 +478,7 @@
           <a:p>
             <a:fld id="{919E3548-B54C-4660-A496-DDF0181B025A}" type="datetimeFigureOut">
               <a:rPr lang="de-DE" smtClean="0"/>
-              <a:t>31.10.2019</a:t>
+              <a:t>04.11.2019</a:t>
             </a:fld>
             <a:endParaRPr lang="de-DE"/>
           </a:p>
@@ -689,7 +688,7 @@
           <a:p>
             <a:fld id="{919E3548-B54C-4660-A496-DDF0181B025A}" type="datetimeFigureOut">
               <a:rPr lang="de-DE" smtClean="0"/>
-              <a:t>31.10.2019</a:t>
+              <a:t>04.11.2019</a:t>
             </a:fld>
             <a:endParaRPr lang="de-DE"/>
           </a:p>
@@ -889,7 +888,7 @@
           <a:p>
             <a:fld id="{919E3548-B54C-4660-A496-DDF0181B025A}" type="datetimeFigureOut">
               <a:rPr lang="de-DE" smtClean="0"/>
-              <a:t>31.10.2019</a:t>
+              <a:t>04.11.2019</a:t>
             </a:fld>
             <a:endParaRPr lang="de-DE"/>
           </a:p>
@@ -1165,7 +1164,7 @@
           <a:p>
             <a:fld id="{919E3548-B54C-4660-A496-DDF0181B025A}" type="datetimeFigureOut">
               <a:rPr lang="de-DE" smtClean="0"/>
-              <a:t>31.10.2019</a:t>
+              <a:t>04.11.2019</a:t>
             </a:fld>
             <a:endParaRPr lang="de-DE"/>
           </a:p>
@@ -1433,7 +1432,7 @@
           <a:p>
             <a:fld id="{919E3548-B54C-4660-A496-DDF0181B025A}" type="datetimeFigureOut">
               <a:rPr lang="de-DE" smtClean="0"/>
-              <a:t>31.10.2019</a:t>
+              <a:t>04.11.2019</a:t>
             </a:fld>
             <a:endParaRPr lang="de-DE"/>
           </a:p>
@@ -1848,7 +1847,7 @@
           <a:p>
             <a:fld id="{919E3548-B54C-4660-A496-DDF0181B025A}" type="datetimeFigureOut">
               <a:rPr lang="de-DE" smtClean="0"/>
-              <a:t>31.10.2019</a:t>
+              <a:t>04.11.2019</a:t>
             </a:fld>
             <a:endParaRPr lang="de-DE"/>
           </a:p>
@@ -1990,7 +1989,7 @@
           <a:p>
             <a:fld id="{919E3548-B54C-4660-A496-DDF0181B025A}" type="datetimeFigureOut">
               <a:rPr lang="de-DE" smtClean="0"/>
-              <a:t>31.10.2019</a:t>
+              <a:t>04.11.2019</a:t>
             </a:fld>
             <a:endParaRPr lang="de-DE"/>
           </a:p>
@@ -2103,7 +2102,7 @@
           <a:p>
             <a:fld id="{919E3548-B54C-4660-A496-DDF0181B025A}" type="datetimeFigureOut">
               <a:rPr lang="de-DE" smtClean="0"/>
-              <a:t>31.10.2019</a:t>
+              <a:t>04.11.2019</a:t>
             </a:fld>
             <a:endParaRPr lang="de-DE"/>
           </a:p>
@@ -2416,7 +2415,7 @@
           <a:p>
             <a:fld id="{919E3548-B54C-4660-A496-DDF0181B025A}" type="datetimeFigureOut">
               <a:rPr lang="de-DE" smtClean="0"/>
-              <a:t>31.10.2019</a:t>
+              <a:t>04.11.2019</a:t>
             </a:fld>
             <a:endParaRPr lang="de-DE"/>
           </a:p>
@@ -2705,7 +2704,7 @@
           <a:p>
             <a:fld id="{919E3548-B54C-4660-A496-DDF0181B025A}" type="datetimeFigureOut">
               <a:rPr lang="de-DE" smtClean="0"/>
-              <a:t>31.10.2019</a:t>
+              <a:t>04.11.2019</a:t>
             </a:fld>
             <a:endParaRPr lang="de-DE"/>
           </a:p>
@@ -2948,7 +2947,7 @@
           <a:p>
             <a:fld id="{919E3548-B54C-4660-A496-DDF0181B025A}" type="datetimeFigureOut">
               <a:rPr lang="de-DE" smtClean="0"/>
-              <a:t>31.10.2019</a:t>
+              <a:t>04.11.2019</a:t>
             </a:fld>
             <a:endParaRPr lang="de-DE"/>
           </a:p>
@@ -3899,6 +3898,407 @@
           <p:cNvPr id="2" name="Title 1">
             <a:extLst>
               <a:ext uri="{FF2B5EF4-FFF2-40B4-BE49-F238E27FC236}">
+                <a16:creationId xmlns:a16="http://schemas.microsoft.com/office/drawing/2014/main" id="{90C381FA-DC0B-41D2-98A8-99331792B92E}"/>
+              </a:ext>
+            </a:extLst>
+          </p:cNvPr>
+          <p:cNvSpPr>
+            <a:spLocks noGrp="1"/>
+          </p:cNvSpPr>
+          <p:nvPr>
+            <p:ph type="title"/>
+          </p:nvPr>
+        </p:nvSpPr>
+        <p:spPr/>
+        <p:txBody>
+          <a:bodyPr/>
+          <a:lstStyle/>
+          <a:p>
+            <a:r>
+              <a:rPr lang="de-DE" dirty="0"/>
+              <a:t>Interaktionen in Java</a:t>
+            </a:r>
+            <a:br>
+              <a:rPr lang="de-DE" dirty="0"/>
+            </a:br>
+            <a:r>
+              <a:rPr lang="de-DE" dirty="0"/>
+              <a:t>- </a:t>
+            </a:r>
+            <a:r>
+              <a:rPr lang="en-US" dirty="0" err="1"/>
+              <a:t>EventListener</a:t>
+            </a:r>
+            <a:endParaRPr lang="de-DE" dirty="0"/>
+          </a:p>
+        </p:txBody>
+      </p:sp>
+      <p:sp>
+        <p:nvSpPr>
+          <p:cNvPr id="3" name="Content Placeholder 2">
+            <a:extLst>
+              <a:ext uri="{FF2B5EF4-FFF2-40B4-BE49-F238E27FC236}">
+                <a16:creationId xmlns:a16="http://schemas.microsoft.com/office/drawing/2014/main" id="{2D13B873-782B-4726-BE05-BBFA72161A8E}"/>
+              </a:ext>
+            </a:extLst>
+          </p:cNvPr>
+          <p:cNvSpPr>
+            <a:spLocks noGrp="1"/>
+          </p:cNvSpPr>
+          <p:nvPr>
+            <p:ph idx="1"/>
+          </p:nvPr>
+        </p:nvSpPr>
+        <p:spPr>
+          <a:xfrm>
+            <a:off x="838200" y="1825624"/>
+            <a:ext cx="10515600" cy="5032375"/>
+          </a:xfrm>
+        </p:spPr>
+        <p:txBody>
+          <a:bodyPr>
+            <a:normAutofit lnSpcReduction="10000"/>
+          </a:bodyPr>
+          <a:lstStyle/>
+          <a:p>
+            <a:r>
+              <a:rPr lang="en-US" dirty="0"/>
+              <a:t>Ein </a:t>
+            </a:r>
+            <a:r>
+              <a:rPr lang="en-US" dirty="0" err="1"/>
+              <a:t>EventListener</a:t>
+            </a:r>
+            <a:r>
+              <a:rPr lang="en-US" dirty="0"/>
+              <a:t> </a:t>
+            </a:r>
+            <a:r>
+              <a:rPr lang="en-US" dirty="0" err="1"/>
+              <a:t>wartet</a:t>
+            </a:r>
+            <a:r>
+              <a:rPr lang="en-US" dirty="0"/>
+              <a:t> bis </a:t>
+            </a:r>
+            <a:r>
+              <a:rPr lang="en-US" dirty="0" err="1"/>
+              <a:t>ein</a:t>
+            </a:r>
+            <a:r>
+              <a:rPr lang="en-US" dirty="0"/>
+              <a:t> </a:t>
+            </a:r>
+            <a:r>
+              <a:rPr lang="en-US" dirty="0" err="1"/>
+              <a:t>bestimmtes</a:t>
+            </a:r>
+            <a:r>
+              <a:rPr lang="en-US" dirty="0"/>
+              <a:t> Event </a:t>
+            </a:r>
+            <a:r>
+              <a:rPr lang="en-US" dirty="0" err="1"/>
+              <a:t>ausgelöst</a:t>
+            </a:r>
+            <a:r>
+              <a:rPr lang="en-US" dirty="0"/>
+              <a:t> </a:t>
+            </a:r>
+            <a:r>
+              <a:rPr lang="en-US" dirty="0" err="1"/>
+              <a:t>wird</a:t>
+            </a:r>
+            <a:r>
+              <a:rPr lang="en-US" dirty="0"/>
+              <a:t>, um </a:t>
+            </a:r>
+            <a:r>
+              <a:rPr lang="en-US" dirty="0" err="1"/>
+              <a:t>darauf</a:t>
+            </a:r>
+            <a:r>
+              <a:rPr lang="en-US" dirty="0"/>
+              <a:t> </a:t>
+            </a:r>
+            <a:r>
+              <a:rPr lang="en-US" dirty="0" err="1"/>
+              <a:t>zu</a:t>
+            </a:r>
+            <a:r>
+              <a:rPr lang="en-US" dirty="0"/>
+              <a:t> </a:t>
+            </a:r>
+            <a:r>
+              <a:rPr lang="en-US" dirty="0" err="1"/>
+              <a:t>reagieren</a:t>
+            </a:r>
+            <a:r>
+              <a:rPr lang="en-US" dirty="0"/>
+              <a:t>. </a:t>
+            </a:r>
+            <a:r>
+              <a:rPr lang="en-US" dirty="0" err="1"/>
+              <a:t>z.B</a:t>
+            </a:r>
+            <a:r>
+              <a:rPr lang="en-US" dirty="0"/>
+              <a:t>.: Button-Press</a:t>
+            </a:r>
+          </a:p>
+          <a:p>
+            <a:pPr marL="0" indent="0">
+              <a:buNone/>
+            </a:pPr>
+            <a:endParaRPr lang="en-US" dirty="0"/>
+          </a:p>
+          <a:p>
+            <a:pPr marL="0" indent="0">
+              <a:buNone/>
+            </a:pPr>
+            <a:r>
+              <a:rPr lang="en-US" sz="2400" dirty="0">
+                <a:latin typeface="Consolas" panose="020B0609020204030204" pitchFamily="49" charset="0"/>
+              </a:rPr>
+              <a:t>Button b = </a:t>
+            </a:r>
+            <a:r>
+              <a:rPr lang="en-US" sz="2400" dirty="0" err="1">
+                <a:latin typeface="Consolas" panose="020B0609020204030204" pitchFamily="49" charset="0"/>
+              </a:rPr>
+              <a:t>findViewById</a:t>
+            </a:r>
+            <a:r>
+              <a:rPr lang="en-US" sz="2400" dirty="0">
+                <a:latin typeface="Consolas" panose="020B0609020204030204" pitchFamily="49" charset="0"/>
+              </a:rPr>
+              <a:t>(</a:t>
+            </a:r>
+            <a:r>
+              <a:rPr lang="en-US" sz="2400" dirty="0" err="1">
+                <a:latin typeface="Consolas" panose="020B0609020204030204" pitchFamily="49" charset="0"/>
+              </a:rPr>
+              <a:t>R.id.button</a:t>
+            </a:r>
+            <a:r>
+              <a:rPr lang="en-US" sz="2400" dirty="0">
+                <a:latin typeface="Consolas" panose="020B0609020204030204" pitchFamily="49" charset="0"/>
+              </a:rPr>
+              <a:t>);</a:t>
+            </a:r>
+          </a:p>
+          <a:p>
+            <a:pPr marL="0" indent="0">
+              <a:buNone/>
+            </a:pPr>
+            <a:r>
+              <a:rPr lang="en-US" sz="2400" dirty="0" err="1">
+                <a:latin typeface="Consolas" panose="020B0609020204030204" pitchFamily="49" charset="0"/>
+              </a:rPr>
+              <a:t>b.setOnClickListener</a:t>
+            </a:r>
+            <a:r>
+              <a:rPr lang="en-US" sz="2400" dirty="0">
+                <a:latin typeface="Consolas" panose="020B0609020204030204" pitchFamily="49" charset="0"/>
+              </a:rPr>
+              <a:t>(new </a:t>
+            </a:r>
+            <a:r>
+              <a:rPr lang="en-US" sz="2400" dirty="0" err="1">
+                <a:latin typeface="Consolas" panose="020B0609020204030204" pitchFamily="49" charset="0"/>
+              </a:rPr>
+              <a:t>View.OnClickListener</a:t>
+            </a:r>
+            <a:r>
+              <a:rPr lang="en-US" sz="2400" dirty="0">
+                <a:latin typeface="Consolas" panose="020B0609020204030204" pitchFamily="49" charset="0"/>
+              </a:rPr>
+              <a:t>() {</a:t>
+            </a:r>
+          </a:p>
+          <a:p>
+            <a:pPr marL="457200" lvl="1" indent="0">
+              <a:buNone/>
+            </a:pPr>
+            <a:r>
+              <a:rPr lang="en-US" dirty="0">
+                <a:latin typeface="Consolas" panose="020B0609020204030204" pitchFamily="49" charset="0"/>
+              </a:rPr>
+              <a:t>@Override</a:t>
+            </a:r>
+          </a:p>
+          <a:p>
+            <a:pPr marL="457200" lvl="1" indent="0">
+              <a:buNone/>
+            </a:pPr>
+            <a:r>
+              <a:rPr lang="en-US" dirty="0">
+                <a:latin typeface="Consolas" panose="020B0609020204030204" pitchFamily="49" charset="0"/>
+              </a:rPr>
+              <a:t>public void </a:t>
+            </a:r>
+            <a:r>
+              <a:rPr lang="en-US" dirty="0" err="1">
+                <a:latin typeface="Consolas" panose="020B0609020204030204" pitchFamily="49" charset="0"/>
+              </a:rPr>
+              <a:t>onClick</a:t>
+            </a:r>
+            <a:r>
+              <a:rPr lang="en-US" dirty="0">
+                <a:latin typeface="Consolas" panose="020B0609020204030204" pitchFamily="49" charset="0"/>
+              </a:rPr>
+              <a:t>(View view) {</a:t>
+            </a:r>
+          </a:p>
+          <a:p>
+            <a:pPr marL="914400" lvl="2" indent="0">
+              <a:buNone/>
+            </a:pPr>
+            <a:r>
+              <a:rPr lang="en-US" sz="2400" dirty="0" err="1">
+                <a:latin typeface="Consolas" panose="020B0609020204030204" pitchFamily="49" charset="0"/>
+              </a:rPr>
+              <a:t>TextView</a:t>
+            </a:r>
+            <a:r>
+              <a:rPr lang="en-US" sz="2400" dirty="0">
+                <a:latin typeface="Consolas" panose="020B0609020204030204" pitchFamily="49" charset="0"/>
+              </a:rPr>
+              <a:t> t = </a:t>
+            </a:r>
+            <a:r>
+              <a:rPr lang="en-US" sz="2400" dirty="0" err="1">
+                <a:latin typeface="Consolas" panose="020B0609020204030204" pitchFamily="49" charset="0"/>
+              </a:rPr>
+              <a:t>findViewById</a:t>
+            </a:r>
+            <a:r>
+              <a:rPr lang="en-US" sz="2400" dirty="0">
+                <a:latin typeface="Consolas" panose="020B0609020204030204" pitchFamily="49" charset="0"/>
+              </a:rPr>
+              <a:t>(</a:t>
+            </a:r>
+            <a:r>
+              <a:rPr lang="en-US" sz="2400" dirty="0" err="1">
+                <a:latin typeface="Consolas" panose="020B0609020204030204" pitchFamily="49" charset="0"/>
+              </a:rPr>
+              <a:t>R.id.text</a:t>
+            </a:r>
+            <a:r>
+              <a:rPr lang="en-US" sz="2400" dirty="0">
+                <a:latin typeface="Consolas" panose="020B0609020204030204" pitchFamily="49" charset="0"/>
+              </a:rPr>
+              <a:t>);</a:t>
+            </a:r>
+          </a:p>
+          <a:p>
+            <a:pPr marL="914400" lvl="2" indent="0">
+              <a:buNone/>
+            </a:pPr>
+            <a:r>
+              <a:rPr lang="en-US" sz="2400" dirty="0" err="1">
+                <a:latin typeface="Consolas" panose="020B0609020204030204" pitchFamily="49" charset="0"/>
+              </a:rPr>
+              <a:t>t.setText</a:t>
+            </a:r>
+            <a:r>
+              <a:rPr lang="en-US" sz="2400" dirty="0">
+                <a:latin typeface="Consolas" panose="020B0609020204030204" pitchFamily="49" charset="0"/>
+              </a:rPr>
+              <a:t>("CLICKED");</a:t>
+            </a:r>
+          </a:p>
+          <a:p>
+            <a:pPr marL="0" indent="0">
+              <a:buNone/>
+            </a:pPr>
+            <a:r>
+              <a:rPr lang="en-US" sz="2400" dirty="0">
+                <a:latin typeface="Consolas" panose="020B0609020204030204" pitchFamily="49" charset="0"/>
+              </a:rPr>
+              <a:t>}});</a:t>
+            </a:r>
+          </a:p>
+          <a:p>
+            <a:pPr marL="0" indent="0">
+              <a:buNone/>
+            </a:pPr>
+            <a:endParaRPr lang="en-US" sz="2400" dirty="0"/>
+          </a:p>
+          <a:p>
+            <a:r>
+              <a:rPr lang="en-US" dirty="0"/>
+              <a:t>Wie </a:t>
+            </a:r>
+            <a:r>
+              <a:rPr lang="en-US" dirty="0" err="1"/>
+              <a:t>wird</a:t>
+            </a:r>
+            <a:r>
+              <a:rPr lang="en-US" dirty="0"/>
+              <a:t> so </a:t>
+            </a:r>
+            <a:r>
+              <a:rPr lang="en-US" dirty="0" err="1"/>
+              <a:t>etwas</a:t>
+            </a:r>
+            <a:r>
+              <a:rPr lang="en-US" dirty="0"/>
+              <a:t> </a:t>
+            </a:r>
+            <a:r>
+              <a:rPr lang="en-US" dirty="0" err="1"/>
+              <a:t>implementiert</a:t>
+            </a:r>
+            <a:r>
+              <a:rPr lang="en-US" dirty="0"/>
+              <a:t>? -&gt; </a:t>
+            </a:r>
+            <a:r>
+              <a:rPr lang="de-DE" dirty="0">
+                <a:hlinkClick r:id="rId2"/>
+              </a:rPr>
+              <a:t>observer pattern</a:t>
+            </a:r>
+            <a:endParaRPr lang="de-DE" dirty="0"/>
+          </a:p>
+        </p:txBody>
+      </p:sp>
+    </p:spTree>
+    <p:extLst>
+      <p:ext uri="{BB962C8B-B14F-4D97-AF65-F5344CB8AC3E}">
+        <p14:creationId xmlns:p14="http://schemas.microsoft.com/office/powerpoint/2010/main" val="324301655"/>
+      </p:ext>
+    </p:extLst>
+  </p:cSld>
+  <p:clrMapOvr>
+    <a:masterClrMapping/>
+  </p:clrMapOvr>
+</p:sld>
+</file>
+
+<file path=ppt/slides/slide11.xml><?xml version="1.0" encoding="utf-8"?>
+<p:sld xmlns:a="http://schemas.openxmlformats.org/drawingml/2006/main" xmlns:r="http://schemas.openxmlformats.org/officeDocument/2006/relationships" xmlns:p="http://schemas.openxmlformats.org/presentationml/2006/main">
+  <p:cSld>
+    <p:spTree>
+      <p:nvGrpSpPr>
+        <p:cNvPr id="1" name=""/>
+        <p:cNvGrpSpPr/>
+        <p:nvPr/>
+      </p:nvGrpSpPr>
+      <p:grpSpPr>
+        <a:xfrm>
+          <a:off x="0" y="0"/>
+          <a:ext cx="0" cy="0"/>
+          <a:chOff x="0" y="0"/>
+          <a:chExt cx="0" cy="0"/>
+        </a:xfrm>
+      </p:grpSpPr>
+      <p:sp>
+        <p:nvSpPr>
+          <p:cNvPr id="2" name="Title 1">
+            <a:extLst>
+              <a:ext uri="{FF2B5EF4-FFF2-40B4-BE49-F238E27FC236}">
                 <a16:creationId xmlns:a16="http://schemas.microsoft.com/office/drawing/2014/main" id="{B0D034D2-D9C9-4F6C-B336-B29D3F8F4996}"/>
               </a:ext>
             </a:extLst>
@@ -3977,133 +4377,6 @@
 </p:sld>
 </file>
 
-<file path=ppt/slides/slide11.xml><?xml version="1.0" encoding="utf-8"?>
-<p:sld xmlns:a="http://schemas.openxmlformats.org/drawingml/2006/main" xmlns:r="http://schemas.openxmlformats.org/officeDocument/2006/relationships" xmlns:p="http://schemas.openxmlformats.org/presentationml/2006/main">
-  <p:cSld>
-    <p:spTree>
-      <p:nvGrpSpPr>
-        <p:cNvPr id="1" name=""/>
-        <p:cNvGrpSpPr/>
-        <p:nvPr/>
-      </p:nvGrpSpPr>
-      <p:grpSpPr>
-        <a:xfrm>
-          <a:off x="0" y="0"/>
-          <a:ext cx="0" cy="0"/>
-          <a:chOff x="0" y="0"/>
-          <a:chExt cx="0" cy="0"/>
-        </a:xfrm>
-      </p:grpSpPr>
-      <p:sp>
-        <p:nvSpPr>
-          <p:cNvPr id="2" name="Title 1">
-            <a:extLst>
-              <a:ext uri="{FF2B5EF4-FFF2-40B4-BE49-F238E27FC236}">
-                <a16:creationId xmlns:a16="http://schemas.microsoft.com/office/drawing/2014/main" id="{6D8C83F8-85C6-4F0C-A7E3-B8AA91CAF32E}"/>
-              </a:ext>
-            </a:extLst>
-          </p:cNvPr>
-          <p:cNvSpPr>
-            <a:spLocks noGrp="1"/>
-          </p:cNvSpPr>
-          <p:nvPr>
-            <p:ph type="title"/>
-          </p:nvPr>
-        </p:nvSpPr>
-        <p:spPr/>
-        <p:txBody>
-          <a:bodyPr/>
-          <a:lstStyle/>
-          <a:p>
-            <a:r>
-              <a:rPr lang="en-US" dirty="0"/>
-              <a:t>View</a:t>
-            </a:r>
-          </a:p>
-        </p:txBody>
-      </p:sp>
-      <p:sp>
-        <p:nvSpPr>
-          <p:cNvPr id="3" name="Content Placeholder 2">
-            <a:extLst>
-              <a:ext uri="{FF2B5EF4-FFF2-40B4-BE49-F238E27FC236}">
-                <a16:creationId xmlns:a16="http://schemas.microsoft.com/office/drawing/2014/main" id="{7595501D-4F72-4125-8EB6-24270E61DEAA}"/>
-              </a:ext>
-            </a:extLst>
-          </p:cNvPr>
-          <p:cNvSpPr>
-            <a:spLocks noGrp="1"/>
-          </p:cNvSpPr>
-          <p:nvPr>
-            <p:ph idx="1"/>
-          </p:nvPr>
-        </p:nvSpPr>
-        <p:spPr/>
-        <p:txBody>
-          <a:bodyPr/>
-          <a:lstStyle/>
-          <a:p>
-            <a:r>
-              <a:rPr lang="en-US" dirty="0" err="1"/>
-              <a:t>Grundlegende</a:t>
-            </a:r>
-            <a:r>
-              <a:rPr lang="en-US" dirty="0"/>
-              <a:t> </a:t>
-            </a:r>
-            <a:r>
-              <a:rPr lang="en-US" dirty="0" err="1"/>
-              <a:t>Klasse</a:t>
-            </a:r>
-            <a:r>
-              <a:rPr lang="en-US" dirty="0"/>
-              <a:t> </a:t>
-            </a:r>
-            <a:r>
-              <a:rPr lang="en-US" dirty="0" err="1"/>
-              <a:t>für</a:t>
-            </a:r>
-            <a:r>
-              <a:rPr lang="en-US" dirty="0"/>
-              <a:t> </a:t>
-            </a:r>
-            <a:r>
-              <a:rPr lang="en-US" dirty="0" err="1"/>
-              <a:t>alle</a:t>
-            </a:r>
-            <a:r>
-              <a:rPr lang="en-US" dirty="0"/>
-              <a:t> </a:t>
-            </a:r>
-            <a:r>
-              <a:rPr lang="en-US" dirty="0" err="1"/>
-              <a:t>sichtbaren</a:t>
-            </a:r>
-            <a:r>
-              <a:rPr lang="en-US" dirty="0"/>
-              <a:t> </a:t>
-            </a:r>
-            <a:r>
-              <a:rPr lang="en-US" dirty="0" err="1"/>
-              <a:t>Komponenten</a:t>
-            </a:r>
-            <a:endParaRPr lang="en-US" dirty="0"/>
-          </a:p>
-        </p:txBody>
-      </p:sp>
-    </p:spTree>
-    <p:extLst>
-      <p:ext uri="{BB962C8B-B14F-4D97-AF65-F5344CB8AC3E}">
-        <p14:creationId xmlns:p14="http://schemas.microsoft.com/office/powerpoint/2010/main" val="652159149"/>
-      </p:ext>
-    </p:extLst>
-  </p:cSld>
-  <p:clrMapOvr>
-    <a:masterClrMapping/>
-  </p:clrMapOvr>
-</p:sld>
-</file>
-
 <file path=ppt/slides/slide12.xml><?xml version="1.0" encoding="utf-8"?>
 <p:sld xmlns:a="http://schemas.openxmlformats.org/drawingml/2006/main" xmlns:r="http://schemas.openxmlformats.org/officeDocument/2006/relationships" xmlns:p="http://schemas.openxmlformats.org/presentationml/2006/main">
   <p:cSld>
@@ -4126,7 +4399,7 @@
           <p:cNvPr id="2" name="Title 1">
             <a:extLst>
               <a:ext uri="{FF2B5EF4-FFF2-40B4-BE49-F238E27FC236}">
-                <a16:creationId xmlns:a16="http://schemas.microsoft.com/office/drawing/2014/main" id="{7FB7DBA9-45B5-4D84-898A-232D34BFACFE}"/>
+                <a16:creationId xmlns:a16="http://schemas.microsoft.com/office/drawing/2014/main" id="{6D8C83F8-85C6-4F0C-A7E3-B8AA91CAF32E}"/>
               </a:ext>
             </a:extLst>
           </p:cNvPr>
@@ -4143,10 +4416,9 @@
           <a:lstStyle/>
           <a:p>
             <a:r>
-              <a:rPr lang="en-US" dirty="0" err="1"/>
-              <a:t>ViewGroup</a:t>
-            </a:r>
-            <a:endParaRPr lang="de-DE" dirty="0"/>
+              <a:rPr lang="en-US" dirty="0"/>
+              <a:t>View</a:t>
+            </a:r>
           </a:p>
         </p:txBody>
       </p:sp>
@@ -4155,7 +4427,7 @@
           <p:cNvPr id="3" name="Content Placeholder 2">
             <a:extLst>
               <a:ext uri="{FF2B5EF4-FFF2-40B4-BE49-F238E27FC236}">
-                <a16:creationId xmlns:a16="http://schemas.microsoft.com/office/drawing/2014/main" id="{6C898B07-866C-4128-A130-025F7A397EA8}"/>
+                <a16:creationId xmlns:a16="http://schemas.microsoft.com/office/drawing/2014/main" id="{7595501D-4F72-4125-8EB6-24270E61DEAA}"/>
               </a:ext>
             </a:extLst>
           </p:cNvPr>
@@ -4166,28 +4438,329 @@
             <p:ph idx="1"/>
           </p:nvPr>
         </p:nvSpPr>
-        <p:spPr/>
+        <p:spPr>
+          <a:xfrm>
+            <a:off x="838200" y="1825625"/>
+            <a:ext cx="10515600" cy="1325563"/>
+          </a:xfrm>
+        </p:spPr>
         <p:txBody>
           <a:bodyPr/>
           <a:lstStyle/>
           <a:p>
             <a:r>
-              <a:rPr lang="de-DE" dirty="0"/>
+              <a:rPr lang="en-US" dirty="0" err="1"/>
+              <a:t>Grundlegende</a:t>
+            </a:r>
+            <a:r>
+              <a:rPr lang="en-US" dirty="0"/>
+              <a:t> </a:t>
+            </a:r>
+            <a:r>
+              <a:rPr lang="en-US" dirty="0" err="1"/>
+              <a:t>Klasse</a:t>
+            </a:r>
+            <a:r>
+              <a:rPr lang="en-US" dirty="0"/>
+              <a:t> </a:t>
+            </a:r>
+            <a:r>
+              <a:rPr lang="en-US" dirty="0" err="1"/>
+              <a:t>für</a:t>
+            </a:r>
+            <a:r>
+              <a:rPr lang="en-US" dirty="0"/>
+              <a:t> </a:t>
+            </a:r>
+            <a:r>
+              <a:rPr lang="en-US" dirty="0" err="1"/>
+              <a:t>alle</a:t>
+            </a:r>
+            <a:r>
+              <a:rPr lang="en-US" dirty="0"/>
+              <a:t> </a:t>
+            </a:r>
+            <a:r>
+              <a:rPr lang="en-US" dirty="0" err="1"/>
+              <a:t>sichtbaren</a:t>
+            </a:r>
+            <a:r>
+              <a:rPr lang="en-US" dirty="0"/>
+              <a:t> </a:t>
+            </a:r>
+            <a:r>
+              <a:rPr lang="en-US" dirty="0" err="1"/>
+              <a:t>Komponenten</a:t>
+            </a:r>
+            <a:endParaRPr lang="en-US" dirty="0"/>
+          </a:p>
+        </p:txBody>
+      </p:sp>
+      <p:sp>
+        <p:nvSpPr>
+          <p:cNvPr id="4" name="Title 1">
+            <a:extLst>
+              <a:ext uri="{FF2B5EF4-FFF2-40B4-BE49-F238E27FC236}">
+                <a16:creationId xmlns:a16="http://schemas.microsoft.com/office/drawing/2014/main" id="{3F6D135E-DF9E-4CB2-9A65-D490508871B0}"/>
+              </a:ext>
+            </a:extLst>
+          </p:cNvPr>
+          <p:cNvSpPr txBox="1">
+            <a:spLocks/>
+          </p:cNvSpPr>
+          <p:nvPr/>
+        </p:nvSpPr>
+        <p:spPr>
+          <a:xfrm>
+            <a:off x="990600" y="3543300"/>
+            <a:ext cx="10515600" cy="1191126"/>
+          </a:xfrm>
+          <a:prstGeom prst="rect">
+            <a:avLst/>
+          </a:prstGeom>
+        </p:spPr>
+        <p:txBody>
+          <a:bodyPr vert="horz" lIns="91440" tIns="45720" rIns="91440" bIns="45720" rtlCol="0" anchor="ctr">
+            <a:normAutofit/>
+          </a:bodyPr>
+          <a:lstStyle>
+            <a:lvl1pPr algn="l" defTabSz="914400" rtl="0" eaLnBrk="1" latinLnBrk="0" hangingPunct="1">
+              <a:lnSpc>
+                <a:spcPct val="90000"/>
+              </a:lnSpc>
+              <a:spcBef>
+                <a:spcPct val="0"/>
+              </a:spcBef>
+              <a:buNone/>
+              <a:defRPr sz="4400" kern="1200">
+                <a:solidFill>
+                  <a:schemeClr val="tx1"/>
+                </a:solidFill>
+                <a:latin typeface="+mj-lt"/>
+                <a:ea typeface="+mj-ea"/>
+                <a:cs typeface="+mj-cs"/>
+              </a:defRPr>
+            </a:lvl1pPr>
+          </a:lstStyle>
+          <a:p>
+            <a:r>
+              <a:rPr lang="en-US" dirty="0" err="1"/>
+              <a:t>ViewGroup</a:t>
+            </a:r>
+            <a:endParaRPr lang="de-DE" dirty="0"/>
+          </a:p>
+        </p:txBody>
+      </p:sp>
+      <p:sp>
+        <p:nvSpPr>
+          <p:cNvPr id="5" name="Content Placeholder 2">
+            <a:extLst>
+              <a:ext uri="{FF2B5EF4-FFF2-40B4-BE49-F238E27FC236}">
+                <a16:creationId xmlns:a16="http://schemas.microsoft.com/office/drawing/2014/main" id="{26066688-2C58-46B9-A266-144DFA126808}"/>
+              </a:ext>
+            </a:extLst>
+          </p:cNvPr>
+          <p:cNvSpPr txBox="1">
+            <a:spLocks/>
+          </p:cNvSpPr>
+          <p:nvPr/>
+        </p:nvSpPr>
+        <p:spPr>
+          <a:xfrm>
+            <a:off x="990600" y="5003799"/>
+            <a:ext cx="10515600" cy="1325563"/>
+          </a:xfrm>
+          <a:prstGeom prst="rect">
+            <a:avLst/>
+          </a:prstGeom>
+        </p:spPr>
+        <p:txBody>
+          <a:bodyPr vert="horz" lIns="91440" tIns="45720" rIns="91440" bIns="45720" rtlCol="0">
+            <a:normAutofit/>
+          </a:bodyPr>
+          <a:lstStyle>
+            <a:lvl1pPr marL="228600" indent="-228600" algn="l" defTabSz="914400" rtl="0" eaLnBrk="1" latinLnBrk="0" hangingPunct="1">
+              <a:lnSpc>
+                <a:spcPct val="90000"/>
+              </a:lnSpc>
+              <a:spcBef>
+                <a:spcPts val="1000"/>
+              </a:spcBef>
+              <a:buFont typeface="Arial" panose="020B0604020202020204" pitchFamily="34" charset="0"/>
+              <a:buChar char="•"/>
+              <a:defRPr sz="2800" kern="1200">
+                <a:solidFill>
+                  <a:schemeClr val="tx1"/>
+                </a:solidFill>
+                <a:latin typeface="+mn-lt"/>
+                <a:ea typeface="+mn-ea"/>
+                <a:cs typeface="+mn-cs"/>
+              </a:defRPr>
+            </a:lvl1pPr>
+            <a:lvl2pPr marL="685800" indent="-228600" algn="l" defTabSz="914400" rtl="0" eaLnBrk="1" latinLnBrk="0" hangingPunct="1">
+              <a:lnSpc>
+                <a:spcPct val="90000"/>
+              </a:lnSpc>
+              <a:spcBef>
+                <a:spcPts val="500"/>
+              </a:spcBef>
+              <a:buFont typeface="Arial" panose="020B0604020202020204" pitchFamily="34" charset="0"/>
+              <a:buChar char="•"/>
+              <a:defRPr sz="2400" kern="1200">
+                <a:solidFill>
+                  <a:schemeClr val="tx1"/>
+                </a:solidFill>
+                <a:latin typeface="+mn-lt"/>
+                <a:ea typeface="+mn-ea"/>
+                <a:cs typeface="+mn-cs"/>
+              </a:defRPr>
+            </a:lvl2pPr>
+            <a:lvl3pPr marL="1143000" indent="-228600" algn="l" defTabSz="914400" rtl="0" eaLnBrk="1" latinLnBrk="0" hangingPunct="1">
+              <a:lnSpc>
+                <a:spcPct val="90000"/>
+              </a:lnSpc>
+              <a:spcBef>
+                <a:spcPts val="500"/>
+              </a:spcBef>
+              <a:buFont typeface="Arial" panose="020B0604020202020204" pitchFamily="34" charset="0"/>
+              <a:buChar char="•"/>
+              <a:defRPr sz="2000" kern="1200">
+                <a:solidFill>
+                  <a:schemeClr val="tx1"/>
+                </a:solidFill>
+                <a:latin typeface="+mn-lt"/>
+                <a:ea typeface="+mn-ea"/>
+                <a:cs typeface="+mn-cs"/>
+              </a:defRPr>
+            </a:lvl3pPr>
+            <a:lvl4pPr marL="1600200" indent="-228600" algn="l" defTabSz="914400" rtl="0" eaLnBrk="1" latinLnBrk="0" hangingPunct="1">
+              <a:lnSpc>
+                <a:spcPct val="90000"/>
+              </a:lnSpc>
+              <a:spcBef>
+                <a:spcPts val="500"/>
+              </a:spcBef>
+              <a:buFont typeface="Arial" panose="020B0604020202020204" pitchFamily="34" charset="0"/>
+              <a:buChar char="•"/>
+              <a:defRPr sz="1800" kern="1200">
+                <a:solidFill>
+                  <a:schemeClr val="tx1"/>
+                </a:solidFill>
+                <a:latin typeface="+mn-lt"/>
+                <a:ea typeface="+mn-ea"/>
+                <a:cs typeface="+mn-cs"/>
+              </a:defRPr>
+            </a:lvl4pPr>
+            <a:lvl5pPr marL="2057400" indent="-228600" algn="l" defTabSz="914400" rtl="0" eaLnBrk="1" latinLnBrk="0" hangingPunct="1">
+              <a:lnSpc>
+                <a:spcPct val="90000"/>
+              </a:lnSpc>
+              <a:spcBef>
+                <a:spcPts val="500"/>
+              </a:spcBef>
+              <a:buFont typeface="Arial" panose="020B0604020202020204" pitchFamily="34" charset="0"/>
+              <a:buChar char="•"/>
+              <a:defRPr sz="1800" kern="1200">
+                <a:solidFill>
+                  <a:schemeClr val="tx1"/>
+                </a:solidFill>
+                <a:latin typeface="+mn-lt"/>
+                <a:ea typeface="+mn-ea"/>
+                <a:cs typeface="+mn-cs"/>
+              </a:defRPr>
+            </a:lvl5pPr>
+            <a:lvl6pPr marL="2514600" indent="-228600" algn="l" defTabSz="914400" rtl="0" eaLnBrk="1" latinLnBrk="0" hangingPunct="1">
+              <a:lnSpc>
+                <a:spcPct val="90000"/>
+              </a:lnSpc>
+              <a:spcBef>
+                <a:spcPts val="500"/>
+              </a:spcBef>
+              <a:buFont typeface="Arial" panose="020B0604020202020204" pitchFamily="34" charset="0"/>
+              <a:buChar char="•"/>
+              <a:defRPr sz="1800" kern="1200">
+                <a:solidFill>
+                  <a:schemeClr val="tx1"/>
+                </a:solidFill>
+                <a:latin typeface="+mn-lt"/>
+                <a:ea typeface="+mn-ea"/>
+                <a:cs typeface="+mn-cs"/>
+              </a:defRPr>
+            </a:lvl6pPr>
+            <a:lvl7pPr marL="2971800" indent="-228600" algn="l" defTabSz="914400" rtl="0" eaLnBrk="1" latinLnBrk="0" hangingPunct="1">
+              <a:lnSpc>
+                <a:spcPct val="90000"/>
+              </a:lnSpc>
+              <a:spcBef>
+                <a:spcPts val="500"/>
+              </a:spcBef>
+              <a:buFont typeface="Arial" panose="020B0604020202020204" pitchFamily="34" charset="0"/>
+              <a:buChar char="•"/>
+              <a:defRPr sz="1800" kern="1200">
+                <a:solidFill>
+                  <a:schemeClr val="tx1"/>
+                </a:solidFill>
+                <a:latin typeface="+mn-lt"/>
+                <a:ea typeface="+mn-ea"/>
+                <a:cs typeface="+mn-cs"/>
+              </a:defRPr>
+            </a:lvl7pPr>
+            <a:lvl8pPr marL="3429000" indent="-228600" algn="l" defTabSz="914400" rtl="0" eaLnBrk="1" latinLnBrk="0" hangingPunct="1">
+              <a:lnSpc>
+                <a:spcPct val="90000"/>
+              </a:lnSpc>
+              <a:spcBef>
+                <a:spcPts val="500"/>
+              </a:spcBef>
+              <a:buFont typeface="Arial" panose="020B0604020202020204" pitchFamily="34" charset="0"/>
+              <a:buChar char="•"/>
+              <a:defRPr sz="1800" kern="1200">
+                <a:solidFill>
+                  <a:schemeClr val="tx1"/>
+                </a:solidFill>
+                <a:latin typeface="+mn-lt"/>
+                <a:ea typeface="+mn-ea"/>
+                <a:cs typeface="+mn-cs"/>
+              </a:defRPr>
+            </a:lvl8pPr>
+            <a:lvl9pPr marL="3886200" indent="-228600" algn="l" defTabSz="914400" rtl="0" eaLnBrk="1" latinLnBrk="0" hangingPunct="1">
+              <a:lnSpc>
+                <a:spcPct val="90000"/>
+              </a:lnSpc>
+              <a:spcBef>
+                <a:spcPts val="500"/>
+              </a:spcBef>
+              <a:buFont typeface="Arial" panose="020B0604020202020204" pitchFamily="34" charset="0"/>
+              <a:buChar char="•"/>
+              <a:defRPr sz="1800" kern="1200">
+                <a:solidFill>
+                  <a:schemeClr val="tx1"/>
+                </a:solidFill>
+                <a:latin typeface="+mn-lt"/>
+                <a:ea typeface="+mn-ea"/>
+                <a:cs typeface="+mn-cs"/>
+              </a:defRPr>
+            </a:lvl9pPr>
+          </a:lstStyle>
+          <a:p>
+            <a:r>
+              <a:rPr lang="de-DE"/>
               <a:t>Kann mehrere Views beinhalten</a:t>
             </a:r>
           </a:p>
           <a:p>
             <a:r>
-              <a:rPr lang="de-DE" dirty="0"/>
+              <a:rPr lang="de-DE"/>
               <a:t>Unsichtbarer Container</a:t>
             </a:r>
+            <a:endParaRPr lang="de-DE" dirty="0"/>
           </a:p>
         </p:txBody>
       </p:sp>
     </p:spTree>
     <p:extLst>
       <p:ext uri="{BB962C8B-B14F-4D97-AF65-F5344CB8AC3E}">
-        <p14:creationId xmlns:p14="http://schemas.microsoft.com/office/powerpoint/2010/main" val="2468258317"/>
+        <p14:creationId xmlns:p14="http://schemas.microsoft.com/office/powerpoint/2010/main" val="652159149"/>
       </p:ext>
     </p:extLst>
   </p:cSld>
@@ -4258,44 +4831,396 @@
             <p:ph idx="1"/>
           </p:nvPr>
         </p:nvSpPr>
-        <p:spPr/>
+        <p:spPr>
+          <a:xfrm>
+            <a:off x="838200" y="1329417"/>
+            <a:ext cx="10515600" cy="2048106"/>
+          </a:xfrm>
+        </p:spPr>
         <p:txBody>
           <a:bodyPr/>
           <a:lstStyle/>
           <a:p>
             <a:r>
               <a:rPr lang="de-DE" dirty="0"/>
-              <a:t>Organisiert Views</a:t>
+              <a:t>Organisiert ViewGroups</a:t>
             </a:r>
           </a:p>
           <a:p>
             <a:r>
               <a:rPr lang="de-DE" dirty="0"/>
-              <a:t>Ordnet diese an nach den jeweiligen Regeln</a:t>
-            </a:r>
-          </a:p>
-          <a:p>
+              <a:t>Ordnet Views an nach den jeweiligen Regeln</a:t>
+            </a:r>
+          </a:p>
+          <a:p>
+            <a:r>
+              <a:rPr lang="en-US" dirty="0" err="1"/>
+              <a:t>LinearLayout</a:t>
+            </a:r>
+            <a:r>
+              <a:rPr lang="en-US" dirty="0"/>
+              <a:t>: </a:t>
+            </a:r>
+          </a:p>
+          <a:p>
+            <a:pPr lvl="1"/>
+            <a:r>
+              <a:rPr lang="en-US" dirty="0" err="1"/>
+              <a:t>ordnet</a:t>
+            </a:r>
+            <a:r>
+              <a:rPr lang="en-US" dirty="0"/>
+              <a:t> Kind-</a:t>
+            </a:r>
+            <a:r>
+              <a:rPr lang="en-US" dirty="0" err="1"/>
+              <a:t>Elemente</a:t>
+            </a:r>
+            <a:r>
+              <a:rPr lang="en-US" dirty="0"/>
+              <a:t> in </a:t>
+            </a:r>
+            <a:r>
+              <a:rPr lang="en-US" dirty="0" err="1"/>
+              <a:t>eine</a:t>
+            </a:r>
+            <a:r>
+              <a:rPr lang="en-US" dirty="0"/>
+              <a:t> </a:t>
+            </a:r>
+            <a:r>
+              <a:rPr lang="en-US" dirty="0" err="1"/>
+              <a:t>einzige</a:t>
+            </a:r>
+            <a:r>
+              <a:rPr lang="en-US" dirty="0"/>
+              <a:t> </a:t>
+            </a:r>
+            <a:r>
+              <a:rPr lang="en-US" dirty="0" err="1"/>
+              <a:t>Richtung</a:t>
+            </a:r>
+            <a:endParaRPr lang="en-US" dirty="0"/>
+          </a:p>
+        </p:txBody>
+      </p:sp>
+      <p:sp>
+        <p:nvSpPr>
+          <p:cNvPr id="4" name="Title 1">
+            <a:extLst>
+              <a:ext uri="{FF2B5EF4-FFF2-40B4-BE49-F238E27FC236}">
+                <a16:creationId xmlns:a16="http://schemas.microsoft.com/office/drawing/2014/main" id="{2DCD69A0-C664-4A3A-84F9-23759C351194}"/>
+              </a:ext>
+            </a:extLst>
+          </p:cNvPr>
+          <p:cNvSpPr txBox="1">
+            <a:spLocks/>
+          </p:cNvSpPr>
+          <p:nvPr/>
+        </p:nvSpPr>
+        <p:spPr>
+          <a:xfrm>
+            <a:off x="838200" y="3016252"/>
+            <a:ext cx="10515600" cy="1325563"/>
+          </a:xfrm>
+          <a:prstGeom prst="rect">
+            <a:avLst/>
+          </a:prstGeom>
+        </p:spPr>
+        <p:txBody>
+          <a:bodyPr vert="horz" lIns="91440" tIns="45720" rIns="91440" bIns="45720" rtlCol="0" anchor="ctr">
+            <a:normAutofit/>
+          </a:bodyPr>
+          <a:lstStyle>
+            <a:lvl1pPr algn="l" defTabSz="914400" rtl="0" eaLnBrk="1" latinLnBrk="0" hangingPunct="1">
+              <a:lnSpc>
+                <a:spcPct val="90000"/>
+              </a:lnSpc>
+              <a:spcBef>
+                <a:spcPct val="0"/>
+              </a:spcBef>
+              <a:buNone/>
+              <a:defRPr sz="4400" kern="1200">
+                <a:solidFill>
+                  <a:schemeClr val="tx1"/>
+                </a:solidFill>
+                <a:latin typeface="+mj-lt"/>
+                <a:ea typeface="+mj-ea"/>
+                <a:cs typeface="+mj-cs"/>
+              </a:defRPr>
+            </a:lvl1pPr>
+          </a:lstStyle>
+          <a:p>
+            <a:r>
+              <a:rPr lang="en-US" dirty="0" err="1"/>
+              <a:t>LayoutManager</a:t>
+            </a:r>
             <a:endParaRPr lang="de-DE" dirty="0"/>
           </a:p>
-          <a:p>
-            <a:r>
-              <a:rPr lang="en-US" dirty="0" err="1"/>
-              <a:t>LinearLayout</a:t>
-            </a:r>
-            <a:r>
-              <a:rPr lang="en-US" dirty="0"/>
-              <a:t>: </a:t>
-            </a:r>
-          </a:p>
-          <a:p>
-            <a:pPr lvl="1"/>
-            <a:r>
-              <a:rPr lang="en-US" dirty="0" err="1"/>
-              <a:t>ordnet</a:t>
-            </a:r>
-            <a:r>
-              <a:rPr lang="en-US" dirty="0"/>
-              <a:t> Kind-</a:t>
+        </p:txBody>
+      </p:sp>
+      <p:sp>
+        <p:nvSpPr>
+          <p:cNvPr id="5" name="Title 1">
+            <a:extLst>
+              <a:ext uri="{FF2B5EF4-FFF2-40B4-BE49-F238E27FC236}">
+                <a16:creationId xmlns:a16="http://schemas.microsoft.com/office/drawing/2014/main" id="{8DEE84D2-FC2F-41F9-B04E-805001F14047}"/>
+              </a:ext>
+            </a:extLst>
+          </p:cNvPr>
+          <p:cNvSpPr txBox="1">
+            <a:spLocks/>
+          </p:cNvSpPr>
+          <p:nvPr/>
+        </p:nvSpPr>
+        <p:spPr>
+          <a:xfrm>
+            <a:off x="838200" y="4341816"/>
+            <a:ext cx="10515600" cy="1325563"/>
+          </a:xfrm>
+          <a:prstGeom prst="rect">
+            <a:avLst/>
+          </a:prstGeom>
+        </p:spPr>
+        <p:txBody>
+          <a:bodyPr vert="horz" lIns="91440" tIns="45720" rIns="91440" bIns="45720" rtlCol="0" anchor="ctr">
+            <a:normAutofit/>
+          </a:bodyPr>
+          <a:lstStyle>
+            <a:lvl1pPr algn="l" defTabSz="914400" rtl="0" eaLnBrk="1" latinLnBrk="0" hangingPunct="1">
+              <a:lnSpc>
+                <a:spcPct val="90000"/>
+              </a:lnSpc>
+              <a:spcBef>
+                <a:spcPct val="0"/>
+              </a:spcBef>
+              <a:buNone/>
+              <a:defRPr sz="4400" kern="1200">
+                <a:solidFill>
+                  <a:schemeClr val="tx1"/>
+                </a:solidFill>
+                <a:latin typeface="+mj-lt"/>
+                <a:ea typeface="+mj-ea"/>
+                <a:cs typeface="+mj-cs"/>
+              </a:defRPr>
+            </a:lvl1pPr>
+          </a:lstStyle>
+          <a:p>
+            <a:r>
+              <a:rPr lang="en-US" dirty="0" err="1"/>
+              <a:t>LayoutInflater</a:t>
+            </a:r>
+            <a:endParaRPr lang="de-DE" dirty="0"/>
+          </a:p>
+        </p:txBody>
+      </p:sp>
+      <p:sp>
+        <p:nvSpPr>
+          <p:cNvPr id="6" name="Content Placeholder 2">
+            <a:extLst>
+              <a:ext uri="{FF2B5EF4-FFF2-40B4-BE49-F238E27FC236}">
+                <a16:creationId xmlns:a16="http://schemas.microsoft.com/office/drawing/2014/main" id="{FAF0181F-654D-4EB5-BEF1-EE2BDE193755}"/>
+              </a:ext>
+            </a:extLst>
+          </p:cNvPr>
+          <p:cNvSpPr txBox="1">
+            <a:spLocks/>
+          </p:cNvSpPr>
+          <p:nvPr/>
+        </p:nvSpPr>
+        <p:spPr>
+          <a:xfrm>
+            <a:off x="838200" y="4161180"/>
+            <a:ext cx="10515600" cy="722543"/>
+          </a:xfrm>
+          <a:prstGeom prst="rect">
+            <a:avLst/>
+          </a:prstGeom>
+        </p:spPr>
+        <p:txBody>
+          <a:bodyPr vert="horz" lIns="91440" tIns="45720" rIns="91440" bIns="45720" rtlCol="0">
+            <a:normAutofit/>
+          </a:bodyPr>
+          <a:lstStyle>
+            <a:lvl1pPr marL="228600" indent="-228600" algn="l" defTabSz="914400" rtl="0" eaLnBrk="1" latinLnBrk="0" hangingPunct="1">
+              <a:lnSpc>
+                <a:spcPct val="90000"/>
+              </a:lnSpc>
+              <a:spcBef>
+                <a:spcPts val="1000"/>
+              </a:spcBef>
+              <a:buFont typeface="Arial" panose="020B0604020202020204" pitchFamily="34" charset="0"/>
+              <a:buChar char="•"/>
+              <a:defRPr sz="2800" kern="1200">
+                <a:solidFill>
+                  <a:schemeClr val="tx1"/>
+                </a:solidFill>
+                <a:latin typeface="+mn-lt"/>
+                <a:ea typeface="+mn-ea"/>
+                <a:cs typeface="+mn-cs"/>
+              </a:defRPr>
+            </a:lvl1pPr>
+            <a:lvl2pPr marL="685800" indent="-228600" algn="l" defTabSz="914400" rtl="0" eaLnBrk="1" latinLnBrk="0" hangingPunct="1">
+              <a:lnSpc>
+                <a:spcPct val="90000"/>
+              </a:lnSpc>
+              <a:spcBef>
+                <a:spcPts val="500"/>
+              </a:spcBef>
+              <a:buFont typeface="Arial" panose="020B0604020202020204" pitchFamily="34" charset="0"/>
+              <a:buChar char="•"/>
+              <a:defRPr sz="2400" kern="1200">
+                <a:solidFill>
+                  <a:schemeClr val="tx1"/>
+                </a:solidFill>
+                <a:latin typeface="+mn-lt"/>
+                <a:ea typeface="+mn-ea"/>
+                <a:cs typeface="+mn-cs"/>
+              </a:defRPr>
+            </a:lvl2pPr>
+            <a:lvl3pPr marL="1143000" indent="-228600" algn="l" defTabSz="914400" rtl="0" eaLnBrk="1" latinLnBrk="0" hangingPunct="1">
+              <a:lnSpc>
+                <a:spcPct val="90000"/>
+              </a:lnSpc>
+              <a:spcBef>
+                <a:spcPts val="500"/>
+              </a:spcBef>
+              <a:buFont typeface="Arial" panose="020B0604020202020204" pitchFamily="34" charset="0"/>
+              <a:buChar char="•"/>
+              <a:defRPr sz="2000" kern="1200">
+                <a:solidFill>
+                  <a:schemeClr val="tx1"/>
+                </a:solidFill>
+                <a:latin typeface="+mn-lt"/>
+                <a:ea typeface="+mn-ea"/>
+                <a:cs typeface="+mn-cs"/>
+              </a:defRPr>
+            </a:lvl3pPr>
+            <a:lvl4pPr marL="1600200" indent="-228600" algn="l" defTabSz="914400" rtl="0" eaLnBrk="1" latinLnBrk="0" hangingPunct="1">
+              <a:lnSpc>
+                <a:spcPct val="90000"/>
+              </a:lnSpc>
+              <a:spcBef>
+                <a:spcPts val="500"/>
+              </a:spcBef>
+              <a:buFont typeface="Arial" panose="020B0604020202020204" pitchFamily="34" charset="0"/>
+              <a:buChar char="•"/>
+              <a:defRPr sz="1800" kern="1200">
+                <a:solidFill>
+                  <a:schemeClr val="tx1"/>
+                </a:solidFill>
+                <a:latin typeface="+mn-lt"/>
+                <a:ea typeface="+mn-ea"/>
+                <a:cs typeface="+mn-cs"/>
+              </a:defRPr>
+            </a:lvl4pPr>
+            <a:lvl5pPr marL="2057400" indent="-228600" algn="l" defTabSz="914400" rtl="0" eaLnBrk="1" latinLnBrk="0" hangingPunct="1">
+              <a:lnSpc>
+                <a:spcPct val="90000"/>
+              </a:lnSpc>
+              <a:spcBef>
+                <a:spcPts val="500"/>
+              </a:spcBef>
+              <a:buFont typeface="Arial" panose="020B0604020202020204" pitchFamily="34" charset="0"/>
+              <a:buChar char="•"/>
+              <a:defRPr sz="1800" kern="1200">
+                <a:solidFill>
+                  <a:schemeClr val="tx1"/>
+                </a:solidFill>
+                <a:latin typeface="+mn-lt"/>
+                <a:ea typeface="+mn-ea"/>
+                <a:cs typeface="+mn-cs"/>
+              </a:defRPr>
+            </a:lvl5pPr>
+            <a:lvl6pPr marL="2514600" indent="-228600" algn="l" defTabSz="914400" rtl="0" eaLnBrk="1" latinLnBrk="0" hangingPunct="1">
+              <a:lnSpc>
+                <a:spcPct val="90000"/>
+              </a:lnSpc>
+              <a:spcBef>
+                <a:spcPts val="500"/>
+              </a:spcBef>
+              <a:buFont typeface="Arial" panose="020B0604020202020204" pitchFamily="34" charset="0"/>
+              <a:buChar char="•"/>
+              <a:defRPr sz="1800" kern="1200">
+                <a:solidFill>
+                  <a:schemeClr val="tx1"/>
+                </a:solidFill>
+                <a:latin typeface="+mn-lt"/>
+                <a:ea typeface="+mn-ea"/>
+                <a:cs typeface="+mn-cs"/>
+              </a:defRPr>
+            </a:lvl6pPr>
+            <a:lvl7pPr marL="2971800" indent="-228600" algn="l" defTabSz="914400" rtl="0" eaLnBrk="1" latinLnBrk="0" hangingPunct="1">
+              <a:lnSpc>
+                <a:spcPct val="90000"/>
+              </a:lnSpc>
+              <a:spcBef>
+                <a:spcPts val="500"/>
+              </a:spcBef>
+              <a:buFont typeface="Arial" panose="020B0604020202020204" pitchFamily="34" charset="0"/>
+              <a:buChar char="•"/>
+              <a:defRPr sz="1800" kern="1200">
+                <a:solidFill>
+                  <a:schemeClr val="tx1"/>
+                </a:solidFill>
+                <a:latin typeface="+mn-lt"/>
+                <a:ea typeface="+mn-ea"/>
+                <a:cs typeface="+mn-cs"/>
+              </a:defRPr>
+            </a:lvl7pPr>
+            <a:lvl8pPr marL="3429000" indent="-228600" algn="l" defTabSz="914400" rtl="0" eaLnBrk="1" latinLnBrk="0" hangingPunct="1">
+              <a:lnSpc>
+                <a:spcPct val="90000"/>
+              </a:lnSpc>
+              <a:spcBef>
+                <a:spcPts val="500"/>
+              </a:spcBef>
+              <a:buFont typeface="Arial" panose="020B0604020202020204" pitchFamily="34" charset="0"/>
+              <a:buChar char="•"/>
+              <a:defRPr sz="1800" kern="1200">
+                <a:solidFill>
+                  <a:schemeClr val="tx1"/>
+                </a:solidFill>
+                <a:latin typeface="+mn-lt"/>
+                <a:ea typeface="+mn-ea"/>
+                <a:cs typeface="+mn-cs"/>
+              </a:defRPr>
+            </a:lvl8pPr>
+            <a:lvl9pPr marL="3886200" indent="-228600" algn="l" defTabSz="914400" rtl="0" eaLnBrk="1" latinLnBrk="0" hangingPunct="1">
+              <a:lnSpc>
+                <a:spcPct val="90000"/>
+              </a:lnSpc>
+              <a:spcBef>
+                <a:spcPts val="500"/>
+              </a:spcBef>
+              <a:buFont typeface="Arial" panose="020B0604020202020204" pitchFamily="34" charset="0"/>
+              <a:buChar char="•"/>
+              <a:defRPr sz="1800" kern="1200">
+                <a:solidFill>
+                  <a:schemeClr val="tx1"/>
+                </a:solidFill>
+                <a:latin typeface="+mn-lt"/>
+                <a:ea typeface="+mn-ea"/>
+                <a:cs typeface="+mn-cs"/>
+              </a:defRPr>
+            </a:lvl9pPr>
+          </a:lstStyle>
+          <a:p>
+            <a:r>
+              <a:rPr lang="en-US" dirty="0" err="1"/>
+              <a:t>Misst</a:t>
+            </a:r>
+            <a:r>
+              <a:rPr lang="en-US" dirty="0"/>
+              <a:t> und </a:t>
+            </a:r>
+            <a:r>
+              <a:rPr lang="en-US" dirty="0" err="1"/>
+              <a:t>positioniert</a:t>
+            </a:r>
+            <a:r>
+              <a:rPr lang="en-US" dirty="0"/>
+              <a:t> </a:t>
             </a:r>
             <a:r>
               <a:rPr lang="en-US" dirty="0" err="1"/>
@@ -4303,19 +5228,11 @@
             </a:r>
             <a:r>
               <a:rPr lang="en-US" dirty="0"/>
-              <a:t> in </a:t>
-            </a:r>
-            <a:r>
-              <a:rPr lang="en-US" dirty="0" err="1"/>
-              <a:t>eine</a:t>
-            </a:r>
-            <a:r>
-              <a:rPr lang="en-US" dirty="0"/>
               <a:t> </a:t>
             </a:r>
             <a:r>
               <a:rPr lang="en-US" dirty="0" err="1"/>
-              <a:t>einzige</a:t>
+              <a:t>im</a:t>
             </a:r>
             <a:r>
               <a:rPr lang="en-US" dirty="0"/>
@@ -4323,33 +5240,207 @@
             </a:r>
             <a:r>
               <a:rPr lang="en-US" dirty="0" err="1"/>
-              <a:t>Richtung</a:t>
+              <a:t>RecyclerView</a:t>
             </a:r>
             <a:endParaRPr lang="en-US" dirty="0"/>
           </a:p>
-          <a:p>
-            <a:r>
-              <a:rPr lang="en-US" dirty="0" err="1"/>
-              <a:t>ListView</a:t>
-            </a:r>
-            <a:r>
-              <a:rPr lang="en-US" dirty="0"/>
-              <a:t>: </a:t>
-            </a:r>
-          </a:p>
-          <a:p>
-            <a:pPr lvl="1"/>
-            <a:r>
-              <a:rPr lang="en-US" dirty="0" err="1"/>
-              <a:t>zeigt</a:t>
-            </a:r>
-            <a:r>
-              <a:rPr lang="en-US" dirty="0"/>
-              <a:t> List von </a:t>
-            </a:r>
-            <a:r>
-              <a:rPr lang="en-US" dirty="0" err="1"/>
-              <a:t>scrollbaren</a:t>
+        </p:txBody>
+      </p:sp>
+      <p:sp>
+        <p:nvSpPr>
+          <p:cNvPr id="7" name="Content Placeholder 2">
+            <a:extLst>
+              <a:ext uri="{FF2B5EF4-FFF2-40B4-BE49-F238E27FC236}">
+                <a16:creationId xmlns:a16="http://schemas.microsoft.com/office/drawing/2014/main" id="{EC2263E1-A343-47D5-81D3-ADB5BEBF0840}"/>
+              </a:ext>
+            </a:extLst>
+          </p:cNvPr>
+          <p:cNvSpPr txBox="1">
+            <a:spLocks/>
+          </p:cNvSpPr>
+          <p:nvPr/>
+        </p:nvSpPr>
+        <p:spPr>
+          <a:xfrm>
+            <a:off x="838200" y="5405206"/>
+            <a:ext cx="10515600" cy="1452793"/>
+          </a:xfrm>
+          <a:prstGeom prst="rect">
+            <a:avLst/>
+          </a:prstGeom>
+        </p:spPr>
+        <p:txBody>
+          <a:bodyPr vert="horz" lIns="91440" tIns="45720" rIns="91440" bIns="45720" rtlCol="0">
+            <a:normAutofit/>
+          </a:bodyPr>
+          <a:lstStyle>
+            <a:lvl1pPr marL="228600" indent="-228600" algn="l" defTabSz="914400" rtl="0" eaLnBrk="1" latinLnBrk="0" hangingPunct="1">
+              <a:lnSpc>
+                <a:spcPct val="90000"/>
+              </a:lnSpc>
+              <a:spcBef>
+                <a:spcPts val="1000"/>
+              </a:spcBef>
+              <a:buFont typeface="Arial" panose="020B0604020202020204" pitchFamily="34" charset="0"/>
+              <a:buChar char="•"/>
+              <a:defRPr sz="2800" kern="1200">
+                <a:solidFill>
+                  <a:schemeClr val="tx1"/>
+                </a:solidFill>
+                <a:latin typeface="+mn-lt"/>
+                <a:ea typeface="+mn-ea"/>
+                <a:cs typeface="+mn-cs"/>
+              </a:defRPr>
+            </a:lvl1pPr>
+            <a:lvl2pPr marL="685800" indent="-228600" algn="l" defTabSz="914400" rtl="0" eaLnBrk="1" latinLnBrk="0" hangingPunct="1">
+              <a:lnSpc>
+                <a:spcPct val="90000"/>
+              </a:lnSpc>
+              <a:spcBef>
+                <a:spcPts val="500"/>
+              </a:spcBef>
+              <a:buFont typeface="Arial" panose="020B0604020202020204" pitchFamily="34" charset="0"/>
+              <a:buChar char="•"/>
+              <a:defRPr sz="2400" kern="1200">
+                <a:solidFill>
+                  <a:schemeClr val="tx1"/>
+                </a:solidFill>
+                <a:latin typeface="+mn-lt"/>
+                <a:ea typeface="+mn-ea"/>
+                <a:cs typeface="+mn-cs"/>
+              </a:defRPr>
+            </a:lvl2pPr>
+            <a:lvl3pPr marL="1143000" indent="-228600" algn="l" defTabSz="914400" rtl="0" eaLnBrk="1" latinLnBrk="0" hangingPunct="1">
+              <a:lnSpc>
+                <a:spcPct val="90000"/>
+              </a:lnSpc>
+              <a:spcBef>
+                <a:spcPts val="500"/>
+              </a:spcBef>
+              <a:buFont typeface="Arial" panose="020B0604020202020204" pitchFamily="34" charset="0"/>
+              <a:buChar char="•"/>
+              <a:defRPr sz="2000" kern="1200">
+                <a:solidFill>
+                  <a:schemeClr val="tx1"/>
+                </a:solidFill>
+                <a:latin typeface="+mn-lt"/>
+                <a:ea typeface="+mn-ea"/>
+                <a:cs typeface="+mn-cs"/>
+              </a:defRPr>
+            </a:lvl3pPr>
+            <a:lvl4pPr marL="1600200" indent="-228600" algn="l" defTabSz="914400" rtl="0" eaLnBrk="1" latinLnBrk="0" hangingPunct="1">
+              <a:lnSpc>
+                <a:spcPct val="90000"/>
+              </a:lnSpc>
+              <a:spcBef>
+                <a:spcPts val="500"/>
+              </a:spcBef>
+              <a:buFont typeface="Arial" panose="020B0604020202020204" pitchFamily="34" charset="0"/>
+              <a:buChar char="•"/>
+              <a:defRPr sz="1800" kern="1200">
+                <a:solidFill>
+                  <a:schemeClr val="tx1"/>
+                </a:solidFill>
+                <a:latin typeface="+mn-lt"/>
+                <a:ea typeface="+mn-ea"/>
+                <a:cs typeface="+mn-cs"/>
+              </a:defRPr>
+            </a:lvl4pPr>
+            <a:lvl5pPr marL="2057400" indent="-228600" algn="l" defTabSz="914400" rtl="0" eaLnBrk="1" latinLnBrk="0" hangingPunct="1">
+              <a:lnSpc>
+                <a:spcPct val="90000"/>
+              </a:lnSpc>
+              <a:spcBef>
+                <a:spcPts val="500"/>
+              </a:spcBef>
+              <a:buFont typeface="Arial" panose="020B0604020202020204" pitchFamily="34" charset="0"/>
+              <a:buChar char="•"/>
+              <a:defRPr sz="1800" kern="1200">
+                <a:solidFill>
+                  <a:schemeClr val="tx1"/>
+                </a:solidFill>
+                <a:latin typeface="+mn-lt"/>
+                <a:ea typeface="+mn-ea"/>
+                <a:cs typeface="+mn-cs"/>
+              </a:defRPr>
+            </a:lvl5pPr>
+            <a:lvl6pPr marL="2514600" indent="-228600" algn="l" defTabSz="914400" rtl="0" eaLnBrk="1" latinLnBrk="0" hangingPunct="1">
+              <a:lnSpc>
+                <a:spcPct val="90000"/>
+              </a:lnSpc>
+              <a:spcBef>
+                <a:spcPts val="500"/>
+              </a:spcBef>
+              <a:buFont typeface="Arial" panose="020B0604020202020204" pitchFamily="34" charset="0"/>
+              <a:buChar char="•"/>
+              <a:defRPr sz="1800" kern="1200">
+                <a:solidFill>
+                  <a:schemeClr val="tx1"/>
+                </a:solidFill>
+                <a:latin typeface="+mn-lt"/>
+                <a:ea typeface="+mn-ea"/>
+                <a:cs typeface="+mn-cs"/>
+              </a:defRPr>
+            </a:lvl6pPr>
+            <a:lvl7pPr marL="2971800" indent="-228600" algn="l" defTabSz="914400" rtl="0" eaLnBrk="1" latinLnBrk="0" hangingPunct="1">
+              <a:lnSpc>
+                <a:spcPct val="90000"/>
+              </a:lnSpc>
+              <a:spcBef>
+                <a:spcPts val="500"/>
+              </a:spcBef>
+              <a:buFont typeface="Arial" panose="020B0604020202020204" pitchFamily="34" charset="0"/>
+              <a:buChar char="•"/>
+              <a:defRPr sz="1800" kern="1200">
+                <a:solidFill>
+                  <a:schemeClr val="tx1"/>
+                </a:solidFill>
+                <a:latin typeface="+mn-lt"/>
+                <a:ea typeface="+mn-ea"/>
+                <a:cs typeface="+mn-cs"/>
+              </a:defRPr>
+            </a:lvl7pPr>
+            <a:lvl8pPr marL="3429000" indent="-228600" algn="l" defTabSz="914400" rtl="0" eaLnBrk="1" latinLnBrk="0" hangingPunct="1">
+              <a:lnSpc>
+                <a:spcPct val="90000"/>
+              </a:lnSpc>
+              <a:spcBef>
+                <a:spcPts val="500"/>
+              </a:spcBef>
+              <a:buFont typeface="Arial" panose="020B0604020202020204" pitchFamily="34" charset="0"/>
+              <a:buChar char="•"/>
+              <a:defRPr sz="1800" kern="1200">
+                <a:solidFill>
+                  <a:schemeClr val="tx1"/>
+                </a:solidFill>
+                <a:latin typeface="+mn-lt"/>
+                <a:ea typeface="+mn-ea"/>
+                <a:cs typeface="+mn-cs"/>
+              </a:defRPr>
+            </a:lvl8pPr>
+            <a:lvl9pPr marL="3886200" indent="-228600" algn="l" defTabSz="914400" rtl="0" eaLnBrk="1" latinLnBrk="0" hangingPunct="1">
+              <a:lnSpc>
+                <a:spcPct val="90000"/>
+              </a:lnSpc>
+              <a:spcBef>
+                <a:spcPts val="500"/>
+              </a:spcBef>
+              <a:buFont typeface="Arial" panose="020B0604020202020204" pitchFamily="34" charset="0"/>
+              <a:buChar char="•"/>
+              <a:defRPr sz="1800" kern="1200">
+                <a:solidFill>
+                  <a:schemeClr val="tx1"/>
+                </a:solidFill>
+                <a:latin typeface="+mn-lt"/>
+                <a:ea typeface="+mn-ea"/>
+                <a:cs typeface="+mn-cs"/>
+              </a:defRPr>
+            </a:lvl9pPr>
+          </a:lstStyle>
+          <a:p>
+            <a:r>
+              <a:rPr lang="en-US" dirty="0" err="1"/>
+              <a:t>Erstellt</a:t>
             </a:r>
             <a:r>
               <a:rPr lang="en-US" dirty="0"/>
@@ -4357,13 +5448,57 @@
             </a:r>
             <a:r>
               <a:rPr lang="en-US" dirty="0" err="1"/>
-              <a:t>Elmenten</a:t>
-            </a:r>
-            <a:r>
-              <a:rPr lang="en-US" dirty="0"/>
-              <a:t> an</a:t>
-            </a:r>
-            <a:endParaRPr lang="de-DE" dirty="0"/>
+              <a:t>neues</a:t>
+            </a:r>
+            <a:r>
+              <a:rPr lang="en-US" dirty="0"/>
+              <a:t> View-Element auf Basis </a:t>
+            </a:r>
+            <a:r>
+              <a:rPr lang="en-US" dirty="0" err="1"/>
+              <a:t>einer</a:t>
+            </a:r>
+            <a:r>
+              <a:rPr lang="en-US" dirty="0"/>
+              <a:t> XML </a:t>
+            </a:r>
+            <a:r>
+              <a:rPr lang="en-US" dirty="0" err="1"/>
+              <a:t>Beschreibung</a:t>
+            </a:r>
+            <a:endParaRPr lang="en-US" dirty="0"/>
+          </a:p>
+          <a:p>
+            <a:r>
+              <a:rPr lang="de-DE" dirty="0"/>
+              <a:t>⚡ </a:t>
+            </a:r>
+            <a:r>
+              <a:rPr lang="de-DE" dirty="0">
+                <a:latin typeface="Consolas" panose="020B0609020204030204" pitchFamily="49" charset="0"/>
+              </a:rPr>
+              <a:t>findViewById</a:t>
+            </a:r>
+            <a:r>
+              <a:rPr lang="de-DE" dirty="0"/>
+              <a:t>: gibt nur eine Referenz auf ein bereits erstellten View -&gt; </a:t>
+            </a:r>
+            <a:r>
+              <a:rPr lang="de-DE" dirty="0">
+                <a:latin typeface="Consolas" panose="020B0609020204030204" pitchFamily="49" charset="0"/>
+              </a:rPr>
+              <a:t>setContentView</a:t>
+            </a:r>
+            <a:r>
+              <a:rPr lang="de-DE" dirty="0"/>
+              <a:t> inflates XML</a:t>
+            </a:r>
+          </a:p>
+          <a:p>
+            <a:endParaRPr lang="de-DE" b="1" dirty="0"/>
+          </a:p>
+          <a:p>
+            <a:endParaRPr lang="en-US" dirty="0"/>
           </a:p>
         </p:txBody>
       </p:sp>
@@ -4442,12 +5577,361 @@
             <p:ph idx="1"/>
           </p:nvPr>
         </p:nvSpPr>
-        <p:spPr/>
-        <p:txBody>
-          <a:bodyPr/>
+        <p:spPr>
+          <a:xfrm>
+            <a:off x="838200" y="1825625"/>
+            <a:ext cx="10515600" cy="984077"/>
+          </a:xfrm>
+        </p:spPr>
+        <p:txBody>
+          <a:bodyPr>
+            <a:normAutofit lnSpcReduction="10000"/>
+          </a:bodyPr>
           <a:lstStyle/>
           <a:p>
-            <a:endParaRPr lang="en-US"/>
+            <a:r>
+              <a:rPr lang="en-US" dirty="0" err="1"/>
+              <a:t>recycelt</a:t>
+            </a:r>
+            <a:r>
+              <a:rPr lang="en-US" dirty="0"/>
+              <a:t> Views </a:t>
+            </a:r>
+            <a:r>
+              <a:rPr lang="en-US" dirty="0" err="1"/>
+              <a:t>wenn</a:t>
+            </a:r>
+            <a:r>
+              <a:rPr lang="en-US" dirty="0"/>
+              <a:t> </a:t>
+            </a:r>
+            <a:r>
+              <a:rPr lang="en-US" dirty="0" err="1"/>
+              <a:t>sie</a:t>
+            </a:r>
+            <a:r>
+              <a:rPr lang="en-US" dirty="0"/>
+              <a:t> </a:t>
+            </a:r>
+            <a:r>
+              <a:rPr lang="en-US" dirty="0" err="1"/>
+              <a:t>nicht</a:t>
+            </a:r>
+            <a:r>
+              <a:rPr lang="en-US" dirty="0"/>
+              <a:t> </a:t>
+            </a:r>
+            <a:r>
+              <a:rPr lang="en-US" dirty="0" err="1"/>
+              <a:t>mehr</a:t>
+            </a:r>
+            <a:r>
+              <a:rPr lang="en-US" dirty="0"/>
+              <a:t> </a:t>
+            </a:r>
+            <a:r>
+              <a:rPr lang="en-US" dirty="0" err="1"/>
+              <a:t>sichtbar</a:t>
+            </a:r>
+            <a:r>
+              <a:rPr lang="en-US" dirty="0"/>
+              <a:t> </a:t>
+            </a:r>
+            <a:r>
+              <a:rPr lang="en-US" dirty="0" err="1"/>
+              <a:t>sind</a:t>
+            </a:r>
+            <a:endParaRPr lang="en-US" dirty="0"/>
+          </a:p>
+          <a:p>
+            <a:r>
+              <a:rPr lang="en-US" dirty="0" err="1"/>
+              <a:t>Anzahl</a:t>
+            </a:r>
+            <a:r>
+              <a:rPr lang="en-US" dirty="0"/>
+              <a:t> der </a:t>
+            </a:r>
+            <a:r>
+              <a:rPr lang="en-US" dirty="0" err="1"/>
+              <a:t>Zeilen</a:t>
+            </a:r>
+            <a:r>
+              <a:rPr lang="en-US" dirty="0"/>
+              <a:t> </a:t>
+            </a:r>
+            <a:r>
+              <a:rPr lang="en-US" dirty="0" err="1"/>
+              <a:t>ändert</a:t>
+            </a:r>
+            <a:r>
+              <a:rPr lang="en-US" dirty="0"/>
+              <a:t> </a:t>
+            </a:r>
+            <a:r>
+              <a:rPr lang="en-US" dirty="0" err="1"/>
+              <a:t>sich</a:t>
+            </a:r>
+            <a:r>
+              <a:rPr lang="en-US" dirty="0"/>
+              <a:t> </a:t>
+            </a:r>
+            <a:r>
+              <a:rPr lang="en-US" dirty="0" err="1"/>
+              <a:t>nicht</a:t>
+            </a:r>
+            <a:endParaRPr lang="en-US" dirty="0"/>
+          </a:p>
+        </p:txBody>
+      </p:sp>
+      <p:sp>
+        <p:nvSpPr>
+          <p:cNvPr id="4" name="Title 1">
+            <a:extLst>
+              <a:ext uri="{FF2B5EF4-FFF2-40B4-BE49-F238E27FC236}">
+                <a16:creationId xmlns:a16="http://schemas.microsoft.com/office/drawing/2014/main" id="{8219C6A6-BD97-4ACE-8169-27D08031BB9D}"/>
+              </a:ext>
+            </a:extLst>
+          </p:cNvPr>
+          <p:cNvSpPr txBox="1">
+            <a:spLocks/>
+          </p:cNvSpPr>
+          <p:nvPr/>
+        </p:nvSpPr>
+        <p:spPr>
+          <a:xfrm>
+            <a:off x="838200" y="3429000"/>
+            <a:ext cx="10515600" cy="1325563"/>
+          </a:xfrm>
+          <a:prstGeom prst="rect">
+            <a:avLst/>
+          </a:prstGeom>
+        </p:spPr>
+        <p:txBody>
+          <a:bodyPr vert="horz" lIns="91440" tIns="45720" rIns="91440" bIns="45720" rtlCol="0" anchor="ctr">
+            <a:normAutofit/>
+          </a:bodyPr>
+          <a:lstStyle>
+            <a:lvl1pPr algn="l" defTabSz="914400" rtl="0" eaLnBrk="1" latinLnBrk="0" hangingPunct="1">
+              <a:lnSpc>
+                <a:spcPct val="90000"/>
+              </a:lnSpc>
+              <a:spcBef>
+                <a:spcPct val="0"/>
+              </a:spcBef>
+              <a:buNone/>
+              <a:defRPr sz="4400" kern="1200">
+                <a:solidFill>
+                  <a:schemeClr val="tx1"/>
+                </a:solidFill>
+                <a:latin typeface="+mj-lt"/>
+                <a:ea typeface="+mj-ea"/>
+                <a:cs typeface="+mj-cs"/>
+              </a:defRPr>
+            </a:lvl1pPr>
+          </a:lstStyle>
+          <a:p>
+            <a:r>
+              <a:rPr lang="en-US" dirty="0" err="1"/>
+              <a:t>ViewHolder</a:t>
+            </a:r>
+            <a:endParaRPr lang="en-US" dirty="0"/>
+          </a:p>
+        </p:txBody>
+      </p:sp>
+      <p:sp>
+        <p:nvSpPr>
+          <p:cNvPr id="5" name="Content Placeholder 2">
+            <a:extLst>
+              <a:ext uri="{FF2B5EF4-FFF2-40B4-BE49-F238E27FC236}">
+                <a16:creationId xmlns:a16="http://schemas.microsoft.com/office/drawing/2014/main" id="{189D7E03-F783-4527-84D4-9C90EA80F381}"/>
+              </a:ext>
+            </a:extLst>
+          </p:cNvPr>
+          <p:cNvSpPr txBox="1">
+            <a:spLocks/>
+          </p:cNvSpPr>
+          <p:nvPr/>
+        </p:nvSpPr>
+        <p:spPr>
+          <a:xfrm>
+            <a:off x="838200" y="5192885"/>
+            <a:ext cx="10515600" cy="984077"/>
+          </a:xfrm>
+          <a:prstGeom prst="rect">
+            <a:avLst/>
+          </a:prstGeom>
+        </p:spPr>
+        <p:txBody>
+          <a:bodyPr vert="horz" lIns="91440" tIns="45720" rIns="91440" bIns="45720" rtlCol="0">
+            <a:normAutofit/>
+          </a:bodyPr>
+          <a:lstStyle>
+            <a:lvl1pPr marL="228600" indent="-228600" algn="l" defTabSz="914400" rtl="0" eaLnBrk="1" latinLnBrk="0" hangingPunct="1">
+              <a:lnSpc>
+                <a:spcPct val="90000"/>
+              </a:lnSpc>
+              <a:spcBef>
+                <a:spcPts val="1000"/>
+              </a:spcBef>
+              <a:buFont typeface="Arial" panose="020B0604020202020204" pitchFamily="34" charset="0"/>
+              <a:buChar char="•"/>
+              <a:defRPr sz="2800" kern="1200">
+                <a:solidFill>
+                  <a:schemeClr val="tx1"/>
+                </a:solidFill>
+                <a:latin typeface="+mn-lt"/>
+                <a:ea typeface="+mn-ea"/>
+                <a:cs typeface="+mn-cs"/>
+              </a:defRPr>
+            </a:lvl1pPr>
+            <a:lvl2pPr marL="685800" indent="-228600" algn="l" defTabSz="914400" rtl="0" eaLnBrk="1" latinLnBrk="0" hangingPunct="1">
+              <a:lnSpc>
+                <a:spcPct val="90000"/>
+              </a:lnSpc>
+              <a:spcBef>
+                <a:spcPts val="500"/>
+              </a:spcBef>
+              <a:buFont typeface="Arial" panose="020B0604020202020204" pitchFamily="34" charset="0"/>
+              <a:buChar char="•"/>
+              <a:defRPr sz="2400" kern="1200">
+                <a:solidFill>
+                  <a:schemeClr val="tx1"/>
+                </a:solidFill>
+                <a:latin typeface="+mn-lt"/>
+                <a:ea typeface="+mn-ea"/>
+                <a:cs typeface="+mn-cs"/>
+              </a:defRPr>
+            </a:lvl2pPr>
+            <a:lvl3pPr marL="1143000" indent="-228600" algn="l" defTabSz="914400" rtl="0" eaLnBrk="1" latinLnBrk="0" hangingPunct="1">
+              <a:lnSpc>
+                <a:spcPct val="90000"/>
+              </a:lnSpc>
+              <a:spcBef>
+                <a:spcPts val="500"/>
+              </a:spcBef>
+              <a:buFont typeface="Arial" panose="020B0604020202020204" pitchFamily="34" charset="0"/>
+              <a:buChar char="•"/>
+              <a:defRPr sz="2000" kern="1200">
+                <a:solidFill>
+                  <a:schemeClr val="tx1"/>
+                </a:solidFill>
+                <a:latin typeface="+mn-lt"/>
+                <a:ea typeface="+mn-ea"/>
+                <a:cs typeface="+mn-cs"/>
+              </a:defRPr>
+            </a:lvl3pPr>
+            <a:lvl4pPr marL="1600200" indent="-228600" algn="l" defTabSz="914400" rtl="0" eaLnBrk="1" latinLnBrk="0" hangingPunct="1">
+              <a:lnSpc>
+                <a:spcPct val="90000"/>
+              </a:lnSpc>
+              <a:spcBef>
+                <a:spcPts val="500"/>
+              </a:spcBef>
+              <a:buFont typeface="Arial" panose="020B0604020202020204" pitchFamily="34" charset="0"/>
+              <a:buChar char="•"/>
+              <a:defRPr sz="1800" kern="1200">
+                <a:solidFill>
+                  <a:schemeClr val="tx1"/>
+                </a:solidFill>
+                <a:latin typeface="+mn-lt"/>
+                <a:ea typeface="+mn-ea"/>
+                <a:cs typeface="+mn-cs"/>
+              </a:defRPr>
+            </a:lvl4pPr>
+            <a:lvl5pPr marL="2057400" indent="-228600" algn="l" defTabSz="914400" rtl="0" eaLnBrk="1" latinLnBrk="0" hangingPunct="1">
+              <a:lnSpc>
+                <a:spcPct val="90000"/>
+              </a:lnSpc>
+              <a:spcBef>
+                <a:spcPts val="500"/>
+              </a:spcBef>
+              <a:buFont typeface="Arial" panose="020B0604020202020204" pitchFamily="34" charset="0"/>
+              <a:buChar char="•"/>
+              <a:defRPr sz="1800" kern="1200">
+                <a:solidFill>
+                  <a:schemeClr val="tx1"/>
+                </a:solidFill>
+                <a:latin typeface="+mn-lt"/>
+                <a:ea typeface="+mn-ea"/>
+                <a:cs typeface="+mn-cs"/>
+              </a:defRPr>
+            </a:lvl5pPr>
+            <a:lvl6pPr marL="2514600" indent="-228600" algn="l" defTabSz="914400" rtl="0" eaLnBrk="1" latinLnBrk="0" hangingPunct="1">
+              <a:lnSpc>
+                <a:spcPct val="90000"/>
+              </a:lnSpc>
+              <a:spcBef>
+                <a:spcPts val="500"/>
+              </a:spcBef>
+              <a:buFont typeface="Arial" panose="020B0604020202020204" pitchFamily="34" charset="0"/>
+              <a:buChar char="•"/>
+              <a:defRPr sz="1800" kern="1200">
+                <a:solidFill>
+                  <a:schemeClr val="tx1"/>
+                </a:solidFill>
+                <a:latin typeface="+mn-lt"/>
+                <a:ea typeface="+mn-ea"/>
+                <a:cs typeface="+mn-cs"/>
+              </a:defRPr>
+            </a:lvl6pPr>
+            <a:lvl7pPr marL="2971800" indent="-228600" algn="l" defTabSz="914400" rtl="0" eaLnBrk="1" latinLnBrk="0" hangingPunct="1">
+              <a:lnSpc>
+                <a:spcPct val="90000"/>
+              </a:lnSpc>
+              <a:spcBef>
+                <a:spcPts val="500"/>
+              </a:spcBef>
+              <a:buFont typeface="Arial" panose="020B0604020202020204" pitchFamily="34" charset="0"/>
+              <a:buChar char="•"/>
+              <a:defRPr sz="1800" kern="1200">
+                <a:solidFill>
+                  <a:schemeClr val="tx1"/>
+                </a:solidFill>
+                <a:latin typeface="+mn-lt"/>
+                <a:ea typeface="+mn-ea"/>
+                <a:cs typeface="+mn-cs"/>
+              </a:defRPr>
+            </a:lvl7pPr>
+            <a:lvl8pPr marL="3429000" indent="-228600" algn="l" defTabSz="914400" rtl="0" eaLnBrk="1" latinLnBrk="0" hangingPunct="1">
+              <a:lnSpc>
+                <a:spcPct val="90000"/>
+              </a:lnSpc>
+              <a:spcBef>
+                <a:spcPts val="500"/>
+              </a:spcBef>
+              <a:buFont typeface="Arial" panose="020B0604020202020204" pitchFamily="34" charset="0"/>
+              <a:buChar char="•"/>
+              <a:defRPr sz="1800" kern="1200">
+                <a:solidFill>
+                  <a:schemeClr val="tx1"/>
+                </a:solidFill>
+                <a:latin typeface="+mn-lt"/>
+                <a:ea typeface="+mn-ea"/>
+                <a:cs typeface="+mn-cs"/>
+              </a:defRPr>
+            </a:lvl8pPr>
+            <a:lvl9pPr marL="3886200" indent="-228600" algn="l" defTabSz="914400" rtl="0" eaLnBrk="1" latinLnBrk="0" hangingPunct="1">
+              <a:lnSpc>
+                <a:spcPct val="90000"/>
+              </a:lnSpc>
+              <a:spcBef>
+                <a:spcPts val="500"/>
+              </a:spcBef>
+              <a:buFont typeface="Arial" panose="020B0604020202020204" pitchFamily="34" charset="0"/>
+              <a:buChar char="•"/>
+              <a:defRPr sz="1800" kern="1200">
+                <a:solidFill>
+                  <a:schemeClr val="tx1"/>
+                </a:solidFill>
+                <a:latin typeface="+mn-lt"/>
+                <a:ea typeface="+mn-ea"/>
+                <a:cs typeface="+mn-cs"/>
+              </a:defRPr>
+            </a:lvl9pPr>
+          </a:lstStyle>
+          <a:p>
+            <a:endParaRPr lang="en-US" dirty="0"/>
           </a:p>
         </p:txBody>
       </p:sp>
@@ -4486,7 +5970,7 @@
           <p:cNvPr id="2" name="Title 1">
             <a:extLst>
               <a:ext uri="{FF2B5EF4-FFF2-40B4-BE49-F238E27FC236}">
-                <a16:creationId xmlns:a16="http://schemas.microsoft.com/office/drawing/2014/main" id="{03F951CC-9584-4A10-ACB5-BB63776CC229}"/>
+                <a16:creationId xmlns:a16="http://schemas.microsoft.com/office/drawing/2014/main" id="{D87AA48D-DFFD-4D4F-943C-3DD94A8DDCDD}"/>
               </a:ext>
             </a:extLst>
           </p:cNvPr>
@@ -4503,10 +5987,9 @@
           <a:lstStyle/>
           <a:p>
             <a:r>
-              <a:rPr lang="en-US" b="1" dirty="0" err="1"/>
-              <a:t>ViewHolder</a:t>
-            </a:r>
-            <a:endParaRPr lang="en-US" b="1" dirty="0"/>
+              <a:rPr lang="en-US" dirty="0"/>
+              <a:t>Adapter</a:t>
+            </a:r>
           </a:p>
         </p:txBody>
       </p:sp>
@@ -4515,7 +5998,7 @@
           <p:cNvPr id="3" name="Content Placeholder 2">
             <a:extLst>
               <a:ext uri="{FF2B5EF4-FFF2-40B4-BE49-F238E27FC236}">
-                <a16:creationId xmlns:a16="http://schemas.microsoft.com/office/drawing/2014/main" id="{B6D14A90-6106-44D5-B745-0606B7CB00A6}"/>
+                <a16:creationId xmlns:a16="http://schemas.microsoft.com/office/drawing/2014/main" id="{F48567FF-33D1-4DDD-B9B3-F583238B1DE7}"/>
               </a:ext>
             </a:extLst>
           </p:cNvPr>
@@ -4532,25 +6015,38 @@
           <a:lstStyle/>
           <a:p>
             <a:r>
-              <a:rPr lang="en-US" dirty="0" err="1"/>
-              <a:t>Hält</a:t>
-            </a:r>
-            <a:r>
-              <a:rPr lang="en-US" dirty="0"/>
-              <a:t> die </a:t>
-            </a:r>
-            <a:r>
-              <a:rPr lang="en-US" dirty="0" err="1"/>
-              <a:t>Daten</a:t>
-            </a:r>
-            <a:endParaRPr lang="en-US" dirty="0"/>
+              <a:rPr lang="en-US" dirty="0"/>
+              <a:t>connect our data to our </a:t>
+            </a:r>
+            <a:r>
+              <a:rPr lang="en-US" dirty="0" err="1"/>
+              <a:t>RecyclerView</a:t>
+            </a:r>
+            <a:r>
+              <a:rPr lang="en-US" dirty="0"/>
+              <a:t> and determine the </a:t>
+            </a:r>
+            <a:r>
+              <a:rPr lang="en-US" dirty="0" err="1"/>
+              <a:t>ViewHolder</a:t>
+            </a:r>
+            <a:r>
+              <a:rPr lang="en-US" dirty="0"/>
+              <a:t>(s) which will need to be used to display that data. </a:t>
+            </a:r>
+          </a:p>
+          <a:p>
+            <a:r>
+              <a:rPr lang="en-US" dirty="0"/>
+              <a:t>separation of concerns principle: and consider it best practice to make the adapter as “dumb” as possible.</a:t>
+            </a:r>
           </a:p>
         </p:txBody>
       </p:sp>
     </p:spTree>
     <p:extLst>
       <p:ext uri="{BB962C8B-B14F-4D97-AF65-F5344CB8AC3E}">
-        <p14:creationId xmlns:p14="http://schemas.microsoft.com/office/powerpoint/2010/main" val="2882194844"/>
+        <p14:creationId xmlns:p14="http://schemas.microsoft.com/office/powerpoint/2010/main" val="3848375840"/>
       </p:ext>
     </p:extLst>
   </p:cSld>
@@ -4582,7 +6078,7 @@
           <p:cNvPr id="2" name="Title 1">
             <a:extLst>
               <a:ext uri="{FF2B5EF4-FFF2-40B4-BE49-F238E27FC236}">
-                <a16:creationId xmlns:a16="http://schemas.microsoft.com/office/drawing/2014/main" id="{D87AA48D-DFFD-4D4F-943C-3DD94A8DDCDD}"/>
+                <a16:creationId xmlns:a16="http://schemas.microsoft.com/office/drawing/2014/main" id="{D1EB0F63-AB25-4BD1-A03A-9D1A17A6C00C}"/>
               </a:ext>
             </a:extLst>
           </p:cNvPr>
@@ -4600,65 +6096,75 @@
           <a:p>
             <a:r>
               <a:rPr lang="en-US" dirty="0"/>
-              <a:t>Adapter</a:t>
-            </a:r>
-          </a:p>
-        </p:txBody>
-      </p:sp>
-      <p:sp>
-        <p:nvSpPr>
-          <p:cNvPr id="3" name="Content Placeholder 2">
-            <a:extLst>
-              <a:ext uri="{FF2B5EF4-FFF2-40B4-BE49-F238E27FC236}">
-                <a16:creationId xmlns:a16="http://schemas.microsoft.com/office/drawing/2014/main" id="{F48567FF-33D1-4DDD-B9B3-F583238B1DE7}"/>
-              </a:ext>
-            </a:extLst>
-          </p:cNvPr>
-          <p:cNvSpPr>
-            <a:spLocks noGrp="1"/>
-          </p:cNvSpPr>
-          <p:nvPr>
-            <p:ph idx="1"/>
-          </p:nvPr>
-        </p:nvSpPr>
-        <p:spPr/>
-        <p:txBody>
-          <a:bodyPr/>
-          <a:lstStyle/>
-          <a:p>
-            <a:r>
-              <a:rPr lang="en-US" dirty="0"/>
-              <a:t>connect our data to our </a:t>
-            </a:r>
-            <a:r>
-              <a:rPr lang="en-US" dirty="0" err="1"/>
-              <a:t>RecyclerView</a:t>
-            </a:r>
-            <a:r>
-              <a:rPr lang="en-US" dirty="0"/>
-              <a:t> and determine the </a:t>
-            </a:r>
-            <a:r>
-              <a:rPr lang="en-US" dirty="0" err="1"/>
-              <a:t>ViewHolder</a:t>
-            </a:r>
-            <a:r>
-              <a:rPr lang="en-US" dirty="0"/>
-              <a:t>(s) which will need to be used to display that data. </a:t>
-            </a:r>
-          </a:p>
-          <a:p>
-            <a:r>
-              <a:rPr lang="en-US" dirty="0"/>
-              <a:t>separation of concerns principle: and consider it best practice to make the adapter as “dumb” as possible.</a:t>
-            </a:r>
-          </a:p>
-        </p:txBody>
-      </p:sp>
+              <a:t>Wie </a:t>
+            </a:r>
+            <a:r>
+              <a:rPr lang="en-US" dirty="0" err="1"/>
+              <a:t>hängen</a:t>
+            </a:r>
+            <a:r>
+              <a:rPr lang="en-US" dirty="0"/>
+              <a:t> die </a:t>
+            </a:r>
+            <a:r>
+              <a:rPr lang="en-US" dirty="0" err="1"/>
+              <a:t>Komponenten</a:t>
+            </a:r>
+            <a:r>
+              <a:rPr lang="en-US" dirty="0"/>
+              <a:t> </a:t>
+            </a:r>
+            <a:r>
+              <a:rPr lang="en-US" dirty="0" err="1"/>
+              <a:t>zusammen</a:t>
+            </a:r>
+            <a:r>
+              <a:rPr lang="en-US" dirty="0"/>
+              <a:t>?</a:t>
+            </a:r>
+          </a:p>
+        </p:txBody>
+      </p:sp>
+      <p:pic>
+        <p:nvPicPr>
+          <p:cNvPr id="8" name="Picture 7">
+            <a:extLst>
+              <a:ext uri="{FF2B5EF4-FFF2-40B4-BE49-F238E27FC236}">
+                <a16:creationId xmlns:a16="http://schemas.microsoft.com/office/drawing/2014/main" id="{EA148EA3-CB6E-4D38-871A-87D2BF79E0F8}"/>
+              </a:ext>
+            </a:extLst>
+          </p:cNvPr>
+          <p:cNvPicPr>
+            <a:picLocks noChangeAspect="1"/>
+          </p:cNvPicPr>
+          <p:nvPr/>
+        </p:nvPicPr>
+        <p:blipFill>
+          <a:blip r:embed="rId2">
+            <a:extLst>
+              <a:ext uri="{28A0092B-C50C-407E-A947-70E740481C1C}">
+                <a14:useLocalDpi xmlns:a14="http://schemas.microsoft.com/office/drawing/2010/main" val="0"/>
+              </a:ext>
+            </a:extLst>
+          </a:blip>
+          <a:stretch>
+            <a:fillRect/>
+          </a:stretch>
+        </p:blipFill>
+        <p:spPr>
+          <a:xfrm>
+            <a:off x="629634" y="2935171"/>
+            <a:ext cx="10932732" cy="2114237"/>
+          </a:xfrm>
+          <a:prstGeom prst="rect">
+            <a:avLst/>
+          </a:prstGeom>
+        </p:spPr>
+      </p:pic>
     </p:spTree>
     <p:extLst>
       <p:ext uri="{BB962C8B-B14F-4D97-AF65-F5344CB8AC3E}">
-        <p14:creationId xmlns:p14="http://schemas.microsoft.com/office/powerpoint/2010/main" val="3848375840"/>
+        <p14:creationId xmlns:p14="http://schemas.microsoft.com/office/powerpoint/2010/main" val="1116550077"/>
       </p:ext>
     </p:extLst>
   </p:cSld>
@@ -4669,7 +6175,7 @@
 </file>
 
 <file path=ppt/slides/slide17.xml><?xml version="1.0" encoding="utf-8"?>
-<p:sld xmlns:a="http://schemas.openxmlformats.org/drawingml/2006/main" xmlns:r="http://schemas.openxmlformats.org/officeDocument/2006/relationships" xmlns:p="http://schemas.openxmlformats.org/presentationml/2006/main">
+<p:sld xmlns:a="http://schemas.openxmlformats.org/drawingml/2006/main" xmlns:r="http://schemas.openxmlformats.org/officeDocument/2006/relationships" xmlns:p="http://schemas.openxmlformats.org/presentationml/2006/main" show="0">
   <p:cSld>
     <p:spTree>
       <p:nvGrpSpPr>
@@ -4690,7 +6196,7 @@
           <p:cNvPr id="2" name="Title 1">
             <a:extLst>
               <a:ext uri="{FF2B5EF4-FFF2-40B4-BE49-F238E27FC236}">
-                <a16:creationId xmlns:a16="http://schemas.microsoft.com/office/drawing/2014/main" id="{0C55568F-4BF8-4F6A-BE00-83A3CE25B8A0}"/>
+                <a16:creationId xmlns:a16="http://schemas.microsoft.com/office/drawing/2014/main" id="{D1EB0F63-AB25-4BD1-A03A-9D1A17A6C00C}"/>
               </a:ext>
             </a:extLst>
           </p:cNvPr>
@@ -4707,42 +6213,239 @@
           <a:lstStyle/>
           <a:p>
             <a:r>
-              <a:rPr lang="en-US" b="1" dirty="0" err="1"/>
+              <a:rPr lang="en-US" dirty="0"/>
+              <a:t>Wie </a:t>
+            </a:r>
+            <a:r>
+              <a:rPr lang="en-US" dirty="0" err="1"/>
+              <a:t>hängen</a:t>
+            </a:r>
+            <a:r>
+              <a:rPr lang="en-US" dirty="0"/>
+              <a:t> die </a:t>
+            </a:r>
+            <a:r>
+              <a:rPr lang="en-US" dirty="0" err="1"/>
+              <a:t>Komponenten</a:t>
+            </a:r>
+            <a:r>
+              <a:rPr lang="en-US" dirty="0"/>
+              <a:t> </a:t>
+            </a:r>
+            <a:r>
+              <a:rPr lang="en-US" dirty="0" err="1"/>
+              <a:t>zusammen</a:t>
+            </a:r>
+            <a:r>
+              <a:rPr lang="en-US" dirty="0"/>
+              <a:t>?</a:t>
+            </a:r>
+          </a:p>
+        </p:txBody>
+      </p:sp>
+      <p:sp>
+        <p:nvSpPr>
+          <p:cNvPr id="4" name="Rectangle 3">
+            <a:extLst>
+              <a:ext uri="{FF2B5EF4-FFF2-40B4-BE49-F238E27FC236}">
+                <a16:creationId xmlns:a16="http://schemas.microsoft.com/office/drawing/2014/main" id="{DEEAAE8C-60BB-4574-84A8-5EE89C1B36E0}"/>
+              </a:ext>
+            </a:extLst>
+          </p:cNvPr>
+          <p:cNvSpPr/>
+          <p:nvPr/>
+        </p:nvSpPr>
+        <p:spPr>
+          <a:xfrm>
+            <a:off x="908650" y="2497347"/>
+            <a:ext cx="2403894" cy="931653"/>
+          </a:xfrm>
+          <a:prstGeom prst="rect">
+            <a:avLst/>
+          </a:prstGeom>
+        </p:spPr>
+        <p:style>
+          <a:lnRef idx="2">
+            <a:schemeClr val="accent1">
+              <a:shade val="50000"/>
+            </a:schemeClr>
+          </a:lnRef>
+          <a:fillRef idx="1">
+            <a:schemeClr val="accent1"/>
+          </a:fillRef>
+          <a:effectRef idx="0">
+            <a:schemeClr val="accent1"/>
+          </a:effectRef>
+          <a:fontRef idx="minor">
+            <a:schemeClr val="lt1"/>
+          </a:fontRef>
+        </p:style>
+        <p:txBody>
+          <a:bodyPr rtlCol="0" anchor="ctr"/>
+          <a:lstStyle/>
+          <a:p>
+            <a:pPr algn="ctr"/>
+            <a:r>
+              <a:rPr lang="en-US" sz="2400" dirty="0" err="1"/>
+              <a:t>RecyclerView</a:t>
+            </a:r>
+            <a:endParaRPr lang="en-US" sz="2400" dirty="0"/>
+          </a:p>
+        </p:txBody>
+      </p:sp>
+      <p:sp>
+        <p:nvSpPr>
+          <p:cNvPr id="5" name="Rectangle 4">
+            <a:extLst>
+              <a:ext uri="{FF2B5EF4-FFF2-40B4-BE49-F238E27FC236}">
+                <a16:creationId xmlns:a16="http://schemas.microsoft.com/office/drawing/2014/main" id="{8CB66468-0F5F-4242-BE1B-59C645B9855C}"/>
+              </a:ext>
+            </a:extLst>
+          </p:cNvPr>
+          <p:cNvSpPr/>
+          <p:nvPr/>
+        </p:nvSpPr>
+        <p:spPr>
+          <a:xfrm>
+            <a:off x="1101306" y="4185249"/>
+            <a:ext cx="2403894" cy="931653"/>
+          </a:xfrm>
+          <a:prstGeom prst="rect">
+            <a:avLst/>
+          </a:prstGeom>
+        </p:spPr>
+        <p:style>
+          <a:lnRef idx="2">
+            <a:schemeClr val="accent1">
+              <a:shade val="50000"/>
+            </a:schemeClr>
+          </a:lnRef>
+          <a:fillRef idx="1">
+            <a:schemeClr val="accent1"/>
+          </a:fillRef>
+          <a:effectRef idx="0">
+            <a:schemeClr val="accent1"/>
+          </a:effectRef>
+          <a:fontRef idx="minor">
+            <a:schemeClr val="lt1"/>
+          </a:fontRef>
+        </p:style>
+        <p:txBody>
+          <a:bodyPr rtlCol="0" anchor="ctr"/>
+          <a:lstStyle/>
+          <a:p>
+            <a:pPr algn="ctr"/>
+            <a:r>
+              <a:rPr lang="en-US" sz="2400" dirty="0" err="1"/>
               <a:t>LayoutInflater</a:t>
             </a:r>
-            <a:endParaRPr lang="de-DE" dirty="0"/>
-          </a:p>
-        </p:txBody>
-      </p:sp>
-      <p:sp>
-        <p:nvSpPr>
-          <p:cNvPr id="3" name="Content Placeholder 2">
-            <a:extLst>
-              <a:ext uri="{FF2B5EF4-FFF2-40B4-BE49-F238E27FC236}">
-                <a16:creationId xmlns:a16="http://schemas.microsoft.com/office/drawing/2014/main" id="{F8843045-C224-4C47-9967-EEB43DCC5625}"/>
-              </a:ext>
-            </a:extLst>
-          </p:cNvPr>
-          <p:cNvSpPr>
-            <a:spLocks noGrp="1"/>
-          </p:cNvSpPr>
-          <p:nvPr>
-            <p:ph idx="1"/>
-          </p:nvPr>
-        </p:nvSpPr>
-        <p:spPr/>
-        <p:txBody>
-          <a:bodyPr/>
+            <a:endParaRPr lang="en-US" sz="2400" dirty="0"/>
+          </a:p>
+        </p:txBody>
+      </p:sp>
+      <p:sp>
+        <p:nvSpPr>
+          <p:cNvPr id="6" name="Rectangle 5">
+            <a:extLst>
+              <a:ext uri="{FF2B5EF4-FFF2-40B4-BE49-F238E27FC236}">
+                <a16:creationId xmlns:a16="http://schemas.microsoft.com/office/drawing/2014/main" id="{EC281AE1-A9FC-449E-B04A-C0C900BD01CA}"/>
+              </a:ext>
+            </a:extLst>
+          </p:cNvPr>
+          <p:cNvSpPr/>
+          <p:nvPr/>
+        </p:nvSpPr>
+        <p:spPr>
+          <a:xfrm>
+            <a:off x="3766869" y="4050102"/>
+            <a:ext cx="2403894" cy="931653"/>
+          </a:xfrm>
+          <a:prstGeom prst="rect">
+            <a:avLst/>
+          </a:prstGeom>
+        </p:spPr>
+        <p:style>
+          <a:lnRef idx="2">
+            <a:schemeClr val="accent1">
+              <a:shade val="50000"/>
+            </a:schemeClr>
+          </a:lnRef>
+          <a:fillRef idx="1">
+            <a:schemeClr val="accent1"/>
+          </a:fillRef>
+          <a:effectRef idx="0">
+            <a:schemeClr val="accent1"/>
+          </a:effectRef>
+          <a:fontRef idx="minor">
+            <a:schemeClr val="lt1"/>
+          </a:fontRef>
+        </p:style>
+        <p:txBody>
+          <a:bodyPr rtlCol="0" anchor="ctr"/>
           <a:lstStyle/>
           <a:p>
-            <a:endParaRPr lang="de-DE"/>
+            <a:pPr algn="ctr"/>
+            <a:r>
+              <a:rPr lang="en-US" sz="2400" dirty="0"/>
+              <a:t>Adapter</a:t>
+            </a:r>
+          </a:p>
+        </p:txBody>
+      </p:sp>
+      <p:sp>
+        <p:nvSpPr>
+          <p:cNvPr id="7" name="Rectangle 6">
+            <a:extLst>
+              <a:ext uri="{FF2B5EF4-FFF2-40B4-BE49-F238E27FC236}">
+                <a16:creationId xmlns:a16="http://schemas.microsoft.com/office/drawing/2014/main" id="{165BAD52-98E3-40A7-9B75-E73CFFDCE65D}"/>
+              </a:ext>
+            </a:extLst>
+          </p:cNvPr>
+          <p:cNvSpPr/>
+          <p:nvPr/>
+        </p:nvSpPr>
+        <p:spPr>
+          <a:xfrm>
+            <a:off x="6317412" y="2336320"/>
+            <a:ext cx="2403894" cy="931653"/>
+          </a:xfrm>
+          <a:prstGeom prst="rect">
+            <a:avLst/>
+          </a:prstGeom>
+        </p:spPr>
+        <p:style>
+          <a:lnRef idx="2">
+            <a:schemeClr val="accent1">
+              <a:shade val="50000"/>
+            </a:schemeClr>
+          </a:lnRef>
+          <a:fillRef idx="1">
+            <a:schemeClr val="accent1"/>
+          </a:fillRef>
+          <a:effectRef idx="0">
+            <a:schemeClr val="accent1"/>
+          </a:effectRef>
+          <a:fontRef idx="minor">
+            <a:schemeClr val="lt1"/>
+          </a:fontRef>
+        </p:style>
+        <p:txBody>
+          <a:bodyPr rtlCol="0" anchor="ctr"/>
+          <a:lstStyle/>
+          <a:p>
+            <a:pPr algn="ctr"/>
+            <a:r>
+              <a:rPr lang="en-US" sz="2400" dirty="0" err="1"/>
+              <a:t>ViewHolder</a:t>
+            </a:r>
+            <a:endParaRPr lang="en-US" sz="2400" dirty="0"/>
           </a:p>
         </p:txBody>
       </p:sp>
     </p:spTree>
     <p:extLst>
       <p:ext uri="{BB962C8B-B14F-4D97-AF65-F5344CB8AC3E}">
-        <p14:creationId xmlns:p14="http://schemas.microsoft.com/office/powerpoint/2010/main" val="3066591137"/>
+        <p14:creationId xmlns:p14="http://schemas.microsoft.com/office/powerpoint/2010/main" val="1276129657"/>
       </p:ext>
     </p:extLst>
   </p:cSld>
@@ -4774,7 +6477,7 @@
           <p:cNvPr id="2" name="Title 1">
             <a:extLst>
               <a:ext uri="{FF2B5EF4-FFF2-40B4-BE49-F238E27FC236}">
-                <a16:creationId xmlns:a16="http://schemas.microsoft.com/office/drawing/2014/main" id="{D1EB0F63-AB25-4BD1-A03A-9D1A17A6C00C}"/>
+                <a16:creationId xmlns:a16="http://schemas.microsoft.com/office/drawing/2014/main" id="{B0D9EB22-4664-4D0C-9BE1-40115CF16FC8}"/>
               </a:ext>
             </a:extLst>
           </p:cNvPr>
@@ -4791,279 +6494,26 @@
           <a:lstStyle/>
           <a:p>
             <a:r>
-              <a:rPr lang="en-US" dirty="0"/>
-              <a:t>Wie </a:t>
-            </a:r>
-            <a:r>
-              <a:rPr lang="en-US" dirty="0" err="1"/>
-              <a:t>hängen</a:t>
-            </a:r>
-            <a:r>
-              <a:rPr lang="en-US" dirty="0"/>
-              <a:t> die </a:t>
-            </a:r>
-            <a:r>
-              <a:rPr lang="en-US" dirty="0" err="1"/>
-              <a:t>Komponenten</a:t>
-            </a:r>
-            <a:r>
-              <a:rPr lang="en-US" dirty="0"/>
-              <a:t> </a:t>
-            </a:r>
-            <a:r>
-              <a:rPr lang="en-US" dirty="0" err="1"/>
-              <a:t>zusammen</a:t>
-            </a:r>
-            <a:r>
-              <a:rPr lang="en-US" dirty="0"/>
-              <a:t>?</a:t>
-            </a:r>
-          </a:p>
-        </p:txBody>
-      </p:sp>
-      <p:sp>
-        <p:nvSpPr>
-          <p:cNvPr id="4" name="Rectangle 3">
-            <a:extLst>
-              <a:ext uri="{FF2B5EF4-FFF2-40B4-BE49-F238E27FC236}">
-                <a16:creationId xmlns:a16="http://schemas.microsoft.com/office/drawing/2014/main" id="{DEEAAE8C-60BB-4574-84A8-5EE89C1B36E0}"/>
-              </a:ext>
-            </a:extLst>
-          </p:cNvPr>
-          <p:cNvSpPr/>
-          <p:nvPr/>
-        </p:nvSpPr>
-        <p:spPr>
-          <a:xfrm>
-            <a:off x="908650" y="2497347"/>
-            <a:ext cx="2403894" cy="931653"/>
-          </a:xfrm>
-          <a:prstGeom prst="rect">
-            <a:avLst/>
-          </a:prstGeom>
-        </p:spPr>
-        <p:style>
-          <a:lnRef idx="2">
-            <a:schemeClr val="accent1">
-              <a:shade val="50000"/>
-            </a:schemeClr>
-          </a:lnRef>
-          <a:fillRef idx="1">
-            <a:schemeClr val="accent1"/>
-          </a:fillRef>
-          <a:effectRef idx="0">
-            <a:schemeClr val="accent1"/>
-          </a:effectRef>
-          <a:fontRef idx="minor">
-            <a:schemeClr val="lt1"/>
-          </a:fontRef>
-        </p:style>
-        <p:txBody>
-          <a:bodyPr rtlCol="0" anchor="ctr"/>
-          <a:lstStyle/>
-          <a:p>
-            <a:pPr algn="ctr"/>
-            <a:r>
-              <a:rPr lang="en-US" sz="2400" dirty="0" err="1"/>
-              <a:t>RecyclerView</a:t>
-            </a:r>
-            <a:endParaRPr lang="en-US" sz="2400" dirty="0"/>
-          </a:p>
-        </p:txBody>
-      </p:sp>
-      <p:sp>
-        <p:nvSpPr>
-          <p:cNvPr id="5" name="Rectangle 4">
-            <a:extLst>
-              <a:ext uri="{FF2B5EF4-FFF2-40B4-BE49-F238E27FC236}">
-                <a16:creationId xmlns:a16="http://schemas.microsoft.com/office/drawing/2014/main" id="{8CB66468-0F5F-4242-BE1B-59C645B9855C}"/>
-              </a:ext>
-            </a:extLst>
-          </p:cNvPr>
-          <p:cNvSpPr/>
-          <p:nvPr/>
-        </p:nvSpPr>
-        <p:spPr>
-          <a:xfrm>
-            <a:off x="1101306" y="4185249"/>
-            <a:ext cx="2403894" cy="931653"/>
-          </a:xfrm>
-          <a:prstGeom prst="rect">
-            <a:avLst/>
-          </a:prstGeom>
-        </p:spPr>
-        <p:style>
-          <a:lnRef idx="2">
-            <a:schemeClr val="accent1">
-              <a:shade val="50000"/>
-            </a:schemeClr>
-          </a:lnRef>
-          <a:fillRef idx="1">
-            <a:schemeClr val="accent1"/>
-          </a:fillRef>
-          <a:effectRef idx="0">
-            <a:schemeClr val="accent1"/>
-          </a:effectRef>
-          <a:fontRef idx="minor">
-            <a:schemeClr val="lt1"/>
-          </a:fontRef>
-        </p:style>
-        <p:txBody>
-          <a:bodyPr rtlCol="0" anchor="ctr"/>
-          <a:lstStyle/>
-          <a:p>
-            <a:pPr algn="ctr"/>
-            <a:r>
-              <a:rPr lang="en-US" sz="2400" dirty="0" err="1"/>
-              <a:t>LayoutInflater</a:t>
-            </a:r>
-            <a:endParaRPr lang="en-US" sz="2400" dirty="0"/>
-          </a:p>
-        </p:txBody>
-      </p:sp>
-      <p:sp>
-        <p:nvSpPr>
-          <p:cNvPr id="6" name="Rectangle 5">
-            <a:extLst>
-              <a:ext uri="{FF2B5EF4-FFF2-40B4-BE49-F238E27FC236}">
-                <a16:creationId xmlns:a16="http://schemas.microsoft.com/office/drawing/2014/main" id="{EC281AE1-A9FC-449E-B04A-C0C900BD01CA}"/>
-              </a:ext>
-            </a:extLst>
-          </p:cNvPr>
-          <p:cNvSpPr/>
-          <p:nvPr/>
-        </p:nvSpPr>
-        <p:spPr>
-          <a:xfrm>
-            <a:off x="3766869" y="4050102"/>
-            <a:ext cx="2403894" cy="931653"/>
-          </a:xfrm>
-          <a:prstGeom prst="rect">
-            <a:avLst/>
-          </a:prstGeom>
-        </p:spPr>
-        <p:style>
-          <a:lnRef idx="2">
-            <a:schemeClr val="accent1">
-              <a:shade val="50000"/>
-            </a:schemeClr>
-          </a:lnRef>
-          <a:fillRef idx="1">
-            <a:schemeClr val="accent1"/>
-          </a:fillRef>
-          <a:effectRef idx="0">
-            <a:schemeClr val="accent1"/>
-          </a:effectRef>
-          <a:fontRef idx="minor">
-            <a:schemeClr val="lt1"/>
-          </a:fontRef>
-        </p:style>
-        <p:txBody>
-          <a:bodyPr rtlCol="0" anchor="ctr"/>
-          <a:lstStyle/>
-          <a:p>
-            <a:pPr algn="ctr"/>
-            <a:r>
-              <a:rPr lang="en-US" sz="2400" dirty="0"/>
-              <a:t>Adapter</a:t>
-            </a:r>
-          </a:p>
-        </p:txBody>
-      </p:sp>
-      <p:sp>
-        <p:nvSpPr>
-          <p:cNvPr id="7" name="Rectangle 6">
-            <a:extLst>
-              <a:ext uri="{FF2B5EF4-FFF2-40B4-BE49-F238E27FC236}">
-                <a16:creationId xmlns:a16="http://schemas.microsoft.com/office/drawing/2014/main" id="{165BAD52-98E3-40A7-9B75-E73CFFDCE65D}"/>
-              </a:ext>
-            </a:extLst>
-          </p:cNvPr>
-          <p:cNvSpPr/>
-          <p:nvPr/>
-        </p:nvSpPr>
-        <p:spPr>
-          <a:xfrm>
-            <a:off x="6317412" y="2336320"/>
-            <a:ext cx="2403894" cy="931653"/>
-          </a:xfrm>
-          <a:prstGeom prst="rect">
-            <a:avLst/>
-          </a:prstGeom>
-        </p:spPr>
-        <p:style>
-          <a:lnRef idx="2">
-            <a:schemeClr val="accent1">
-              <a:shade val="50000"/>
-            </a:schemeClr>
-          </a:lnRef>
-          <a:fillRef idx="1">
-            <a:schemeClr val="accent1"/>
-          </a:fillRef>
-          <a:effectRef idx="0">
-            <a:schemeClr val="accent1"/>
-          </a:effectRef>
-          <a:fontRef idx="minor">
-            <a:schemeClr val="lt1"/>
-          </a:fontRef>
-        </p:style>
-        <p:txBody>
-          <a:bodyPr rtlCol="0" anchor="ctr"/>
-          <a:lstStyle/>
-          <a:p>
-            <a:pPr algn="ctr"/>
-            <a:r>
-              <a:rPr lang="en-US" sz="2400" dirty="0" err="1"/>
-              <a:t>ViewHolder</a:t>
-            </a:r>
-            <a:endParaRPr lang="en-US" sz="2400" dirty="0"/>
-          </a:p>
-        </p:txBody>
-      </p:sp>
-    </p:spTree>
-    <p:extLst>
-      <p:ext uri="{BB962C8B-B14F-4D97-AF65-F5344CB8AC3E}">
-        <p14:creationId xmlns:p14="http://schemas.microsoft.com/office/powerpoint/2010/main" val="1116550077"/>
-      </p:ext>
-    </p:extLst>
-  </p:cSld>
-  <p:clrMapOvr>
-    <a:masterClrMapping/>
-  </p:clrMapOvr>
-</p:sld>
-</file>
-
-<file path=ppt/slides/slide19.xml><?xml version="1.0" encoding="utf-8"?>
-<p:sld xmlns:a="http://schemas.openxmlformats.org/drawingml/2006/main" xmlns:r="http://schemas.openxmlformats.org/officeDocument/2006/relationships" xmlns:p="http://schemas.openxmlformats.org/presentationml/2006/main">
-  <p:cSld>
-    <p:spTree>
-      <p:nvGrpSpPr>
-        <p:cNvPr id="1" name=""/>
-        <p:cNvGrpSpPr/>
-        <p:nvPr/>
-      </p:nvGrpSpPr>
-      <p:grpSpPr>
-        <a:xfrm>
-          <a:off x="0" y="0"/>
-          <a:ext cx="0" cy="0"/>
-          <a:chOff x="0" y="0"/>
-          <a:chExt cx="0" cy="0"/>
-        </a:xfrm>
-      </p:grpSpPr>
-      <p:sp>
-        <p:nvSpPr>
-          <p:cNvPr id="2" name="Title 1">
-            <a:extLst>
-              <a:ext uri="{FF2B5EF4-FFF2-40B4-BE49-F238E27FC236}">
-                <a16:creationId xmlns:a16="http://schemas.microsoft.com/office/drawing/2014/main" id="{B0D9EB22-4664-4D0C-9BE1-40115CF16FC8}"/>
-              </a:ext>
-            </a:extLst>
-          </p:cNvPr>
-          <p:cNvSpPr>
-            <a:spLocks noGrp="1"/>
-          </p:cNvSpPr>
-          <p:nvPr>
-            <p:ph type="title"/>
+              <a:rPr lang="de-DE" dirty="0"/>
+              <a:t>Weitere Nützliche Komponenten</a:t>
+            </a:r>
+          </a:p>
+        </p:txBody>
+      </p:sp>
+      <p:sp>
+        <p:nvSpPr>
+          <p:cNvPr id="3" name="Content Placeholder 2">
+            <a:extLst>
+              <a:ext uri="{FF2B5EF4-FFF2-40B4-BE49-F238E27FC236}">
+                <a16:creationId xmlns:a16="http://schemas.microsoft.com/office/drawing/2014/main" id="{92927136-A001-457C-A859-5215DFFD0E8A}"/>
+              </a:ext>
+            </a:extLst>
+          </p:cNvPr>
+          <p:cNvSpPr>
+            <a:spLocks noGrp="1"/>
+          </p:cNvSpPr>
+          <p:nvPr>
+            <p:ph idx="1"/>
           </p:nvPr>
         </p:nvSpPr>
         <p:spPr/>
@@ -5072,34 +6522,30 @@
           <a:lstStyle/>
           <a:p>
             <a:r>
-              <a:rPr lang="de-DE" dirty="0"/>
-              <a:t>Weitere Nützliche Komponenten</a:t>
-            </a:r>
-          </a:p>
-        </p:txBody>
-      </p:sp>
-      <p:sp>
-        <p:nvSpPr>
-          <p:cNvPr id="3" name="Content Placeholder 2">
-            <a:extLst>
-              <a:ext uri="{FF2B5EF4-FFF2-40B4-BE49-F238E27FC236}">
-                <a16:creationId xmlns:a16="http://schemas.microsoft.com/office/drawing/2014/main" id="{92927136-A001-457C-A859-5215DFFD0E8A}"/>
-              </a:ext>
-            </a:extLst>
-          </p:cNvPr>
-          <p:cNvSpPr>
-            <a:spLocks noGrp="1"/>
-          </p:cNvSpPr>
-          <p:nvPr>
-            <p:ph idx="1"/>
-          </p:nvPr>
-        </p:nvSpPr>
-        <p:spPr/>
-        <p:txBody>
-          <a:bodyPr/>
-          <a:lstStyle/>
-          <a:p>
-            <a:endParaRPr lang="de-DE"/>
+              <a:rPr lang="en-US" dirty="0" err="1"/>
+              <a:t>TextView</a:t>
+            </a:r>
+            <a:endParaRPr lang="en-US" dirty="0"/>
+          </a:p>
+          <a:p>
+            <a:r>
+              <a:rPr lang="en-US" dirty="0"/>
+              <a:t>Button</a:t>
+            </a:r>
+          </a:p>
+          <a:p>
+            <a:r>
+              <a:rPr lang="en-US" dirty="0" err="1"/>
+              <a:t>ImageView</a:t>
+            </a:r>
+            <a:endParaRPr lang="en-US" dirty="0"/>
+          </a:p>
+          <a:p>
+            <a:r>
+              <a:rPr lang="en-US" dirty="0"/>
+              <a:t>…</a:t>
+            </a:r>
+            <a:endParaRPr lang="de-DE" dirty="0"/>
           </a:p>
         </p:txBody>
       </p:sp>
@@ -5280,6 +6726,54 @@
             </a:r>
             <a:r>
               <a:rPr lang="en-US" dirty="0" err="1"/>
+              <a:t>Komponenten</a:t>
+            </a:r>
+            <a:r>
+              <a:rPr lang="en-US" dirty="0"/>
+              <a:t> </a:t>
+            </a:r>
+            <a:r>
+              <a:rPr lang="en-US" dirty="0" err="1"/>
+              <a:t>gibt</a:t>
+            </a:r>
+            <a:r>
+              <a:rPr lang="en-US" dirty="0"/>
+              <a:t> es </a:t>
+            </a:r>
+            <a:r>
+              <a:rPr lang="en-US" dirty="0" err="1"/>
+              <a:t>bei</a:t>
+            </a:r>
+            <a:r>
+              <a:rPr lang="en-US" dirty="0"/>
+              <a:t> der Android </a:t>
+            </a:r>
+            <a:r>
+              <a:rPr lang="en-US" dirty="0" err="1"/>
+              <a:t>Programmierung</a:t>
+            </a:r>
+            <a:r>
+              <a:rPr lang="en-US" dirty="0"/>
+              <a:t>?</a:t>
+            </a:r>
+          </a:p>
+          <a:p>
+            <a:pPr marL="0" indent="0">
+              <a:buNone/>
+            </a:pPr>
+            <a:endParaRPr lang="en-US" dirty="0"/>
+          </a:p>
+          <a:p>
+            <a:r>
+              <a:rPr lang="en-US" dirty="0" err="1"/>
+              <a:t>Welche</a:t>
+            </a:r>
+            <a:r>
+              <a:rPr lang="en-US" dirty="0"/>
+              <a:t> </a:t>
+            </a:r>
+            <a:r>
+              <a:rPr lang="en-US" dirty="0" err="1"/>
               <a:t>Elemente</a:t>
             </a:r>
             <a:r>
@@ -5312,6 +6806,9 @@
             </a:r>
           </a:p>
           <a:p>
+            <a:endParaRPr lang="en-US" dirty="0"/>
+          </a:p>
+          <a:p>
             <a:r>
               <a:rPr lang="en-US" dirty="0"/>
               <a:t>Was </a:t>
@@ -5348,6 +6845,9 @@
               <a:rPr lang="en-US" dirty="0"/>
               <a:t>?</a:t>
             </a:r>
+          </a:p>
+          <a:p>
+            <a:endParaRPr lang="en-US" dirty="0"/>
           </a:p>
           <a:p>
             <a:r>
@@ -5455,6 +6955,17 @@
           <a:p>
             <a:r>
               <a:rPr lang="en-US" dirty="0"/>
+              <a:t>Android </a:t>
+            </a:r>
+            <a:r>
+              <a:rPr lang="en-US" dirty="0" err="1"/>
+              <a:t>Komponenten</a:t>
+            </a:r>
+            <a:endParaRPr lang="en-US" dirty="0"/>
+          </a:p>
+          <a:p>
+            <a:r>
+              <a:rPr lang="en-US" dirty="0"/>
               <a:t>Activity</a:t>
             </a:r>
           </a:p>
@@ -5522,6 +7033,178 @@
           <p:cNvPr id="2" name="Title 1">
             <a:extLst>
               <a:ext uri="{FF2B5EF4-FFF2-40B4-BE49-F238E27FC236}">
+                <a16:creationId xmlns:a16="http://schemas.microsoft.com/office/drawing/2014/main" id="{595D9AAD-DDE5-4F24-AC4E-25DD02B8E6C8}"/>
+              </a:ext>
+            </a:extLst>
+          </p:cNvPr>
+          <p:cNvSpPr>
+            <a:spLocks noGrp="1"/>
+          </p:cNvSpPr>
+          <p:nvPr>
+            <p:ph type="title"/>
+          </p:nvPr>
+        </p:nvSpPr>
+        <p:spPr/>
+        <p:txBody>
+          <a:bodyPr/>
+          <a:lstStyle/>
+          <a:p>
+            <a:r>
+              <a:rPr lang="en-US" dirty="0"/>
+              <a:t>Android </a:t>
+            </a:r>
+            <a:r>
+              <a:rPr lang="en-US" dirty="0" err="1"/>
+              <a:t>Komponenten</a:t>
+            </a:r>
+            <a:endParaRPr lang="de-DE" dirty="0"/>
+          </a:p>
+        </p:txBody>
+      </p:sp>
+      <p:sp>
+        <p:nvSpPr>
+          <p:cNvPr id="3" name="Content Placeholder 2">
+            <a:extLst>
+              <a:ext uri="{FF2B5EF4-FFF2-40B4-BE49-F238E27FC236}">
+                <a16:creationId xmlns:a16="http://schemas.microsoft.com/office/drawing/2014/main" id="{82FC2891-1346-438F-83E5-DD3A504E627A}"/>
+              </a:ext>
+            </a:extLst>
+          </p:cNvPr>
+          <p:cNvSpPr>
+            <a:spLocks noGrp="1"/>
+          </p:cNvSpPr>
+          <p:nvPr>
+            <p:ph idx="1"/>
+          </p:nvPr>
+        </p:nvSpPr>
+        <p:spPr>
+          <a:xfrm>
+            <a:off x="838200" y="1825624"/>
+            <a:ext cx="10515600" cy="5032375"/>
+          </a:xfrm>
+        </p:spPr>
+        <p:txBody>
+          <a:bodyPr>
+            <a:normAutofit lnSpcReduction="10000"/>
+          </a:bodyPr>
+          <a:lstStyle/>
+          <a:p>
+            <a:r>
+              <a:rPr lang="de-DE" dirty="0"/>
+              <a:t>Activity:</a:t>
+            </a:r>
+          </a:p>
+          <a:p>
+            <a:pPr lvl="1"/>
+            <a:r>
+              <a:rPr lang="de-DE" dirty="0"/>
+              <a:t>Bildschirmseite mit Bedienelementen</a:t>
+            </a:r>
+          </a:p>
+          <a:p>
+            <a:pPr lvl="1"/>
+            <a:r>
+              <a:rPr lang="de-DE" dirty="0"/>
+              <a:t>PokemonDetails Ansicht</a:t>
+            </a:r>
+          </a:p>
+          <a:p>
+            <a:r>
+              <a:rPr lang="de-DE" dirty="0"/>
+              <a:t>Service: </a:t>
+            </a:r>
+          </a:p>
+          <a:p>
+            <a:pPr lvl="1"/>
+            <a:r>
+              <a:rPr lang="de-DE" dirty="0"/>
+              <a:t>länger laufende Aufgaben im Hintergrund:</a:t>
+            </a:r>
+          </a:p>
+          <a:p>
+            <a:pPr lvl="1"/>
+            <a:r>
+              <a:rPr lang="de-DE" dirty="0"/>
+              <a:t>Laden von Pokemon von einem Server</a:t>
+            </a:r>
+          </a:p>
+          <a:p>
+            <a:r>
+              <a:rPr lang="de-DE" dirty="0"/>
+              <a:t>Broadcast Receiver: </a:t>
+            </a:r>
+          </a:p>
+          <a:p>
+            <a:pPr lvl="1"/>
+            <a:r>
+              <a:rPr lang="de-DE" dirty="0"/>
+              <a:t>Empfangen von externen Events</a:t>
+            </a:r>
+          </a:p>
+          <a:p>
+            <a:pPr lvl="1"/>
+            <a:r>
+              <a:rPr lang="de-DE" dirty="0"/>
+              <a:t>Internetverbindung hergestellt</a:t>
+            </a:r>
+          </a:p>
+          <a:p>
+            <a:r>
+              <a:rPr lang="de-DE" dirty="0"/>
+              <a:t>Content Provider: </a:t>
+            </a:r>
+          </a:p>
+          <a:p>
+            <a:pPr lvl="1"/>
+            <a:r>
+              <a:rPr lang="de-DE" dirty="0"/>
+              <a:t>Daten-Schnittstelle für andere Apps</a:t>
+            </a:r>
+          </a:p>
+          <a:p>
+            <a:pPr lvl="1"/>
+            <a:r>
+              <a:rPr lang="de-DE" dirty="0"/>
+              <a:t>Pokemon Liste zur Verfügung stellen</a:t>
+            </a:r>
+          </a:p>
+        </p:txBody>
+      </p:sp>
+    </p:spTree>
+    <p:extLst>
+      <p:ext uri="{BB962C8B-B14F-4D97-AF65-F5344CB8AC3E}">
+        <p14:creationId xmlns:p14="http://schemas.microsoft.com/office/powerpoint/2010/main" val="1388702578"/>
+      </p:ext>
+    </p:extLst>
+  </p:cSld>
+  <p:clrMapOvr>
+    <a:masterClrMapping/>
+  </p:clrMapOvr>
+</p:sld>
+</file>
+
+<file path=ppt/slides/slide6.xml><?xml version="1.0" encoding="utf-8"?>
+<p:sld xmlns:a="http://schemas.openxmlformats.org/drawingml/2006/main" xmlns:r="http://schemas.openxmlformats.org/officeDocument/2006/relationships" xmlns:p="http://schemas.openxmlformats.org/presentationml/2006/main">
+  <p:cSld>
+    <p:spTree>
+      <p:nvGrpSpPr>
+        <p:cNvPr id="1" name=""/>
+        <p:cNvGrpSpPr/>
+        <p:nvPr/>
+      </p:nvGrpSpPr>
+      <p:grpSpPr>
+        <a:xfrm>
+          <a:off x="0" y="0"/>
+          <a:ext cx="0" cy="0"/>
+          <a:chOff x="0" y="0"/>
+          <a:chExt cx="0" cy="0"/>
+        </a:xfrm>
+      </p:grpSpPr>
+      <p:sp>
+        <p:nvSpPr>
+          <p:cNvPr id="2" name="Title 1">
+            <a:extLst>
+              <a:ext uri="{FF2B5EF4-FFF2-40B4-BE49-F238E27FC236}">
                 <a16:creationId xmlns:a16="http://schemas.microsoft.com/office/drawing/2014/main" id="{71DED62D-330B-42EA-A4DF-106CE2927522}"/>
               </a:ext>
             </a:extLst>
@@ -5740,7 +7423,7 @@
 </p:sld>
 </file>
 
-<file path=ppt/slides/slide6.xml><?xml version="1.0" encoding="utf-8"?>
+<file path=ppt/slides/slide7.xml><?xml version="1.0" encoding="utf-8"?>
 <p:sld xmlns:a="http://schemas.openxmlformats.org/drawingml/2006/main" xmlns:r="http://schemas.openxmlformats.org/officeDocument/2006/relationships" xmlns:p="http://schemas.openxmlformats.org/presentationml/2006/main">
   <p:cSld>
     <p:spTree>
@@ -6065,7 +7748,7 @@
 </p:sld>
 </file>
 
-<file path=ppt/slides/slide7.xml><?xml version="1.0" encoding="utf-8"?>
+<file path=ppt/slides/slide8.xml><?xml version="1.0" encoding="utf-8"?>
 <p:sld xmlns:a="http://schemas.openxmlformats.org/drawingml/2006/main" xmlns:r="http://schemas.openxmlformats.org/officeDocument/2006/relationships" xmlns:p="http://schemas.openxmlformats.org/presentationml/2006/main">
   <p:cSld>
     <p:spTree>
@@ -6309,231 +7992,6 @@
 </p:sld>
 </file>
 
-<file path=ppt/slides/slide8.xml><?xml version="1.0" encoding="utf-8"?>
-<p:sld xmlns:a="http://schemas.openxmlformats.org/drawingml/2006/main" xmlns:r="http://schemas.openxmlformats.org/officeDocument/2006/relationships" xmlns:p="http://schemas.openxmlformats.org/presentationml/2006/main">
-  <p:cSld>
-    <p:spTree>
-      <p:nvGrpSpPr>
-        <p:cNvPr id="1" name=""/>
-        <p:cNvGrpSpPr/>
-        <p:nvPr/>
-      </p:nvGrpSpPr>
-      <p:grpSpPr>
-        <a:xfrm>
-          <a:off x="0" y="0"/>
-          <a:ext cx="0" cy="0"/>
-          <a:chOff x="0" y="0"/>
-          <a:chExt cx="0" cy="0"/>
-        </a:xfrm>
-      </p:grpSpPr>
-      <p:sp>
-        <p:nvSpPr>
-          <p:cNvPr id="2" name="Title 1">
-            <a:extLst>
-              <a:ext uri="{FF2B5EF4-FFF2-40B4-BE49-F238E27FC236}">
-                <a16:creationId xmlns:a16="http://schemas.microsoft.com/office/drawing/2014/main" id="{92849CA7-5049-4BE3-AC06-AA2547BC08AA}"/>
-              </a:ext>
-            </a:extLst>
-          </p:cNvPr>
-          <p:cNvSpPr>
-            <a:spLocks noGrp="1"/>
-          </p:cNvSpPr>
-          <p:nvPr>
-            <p:ph type="title"/>
-          </p:nvPr>
-        </p:nvSpPr>
-        <p:spPr/>
-        <p:txBody>
-          <a:bodyPr/>
-          <a:lstStyle/>
-          <a:p>
-            <a:r>
-              <a:rPr lang="en-US" dirty="0" err="1"/>
-              <a:t>Interaktionen</a:t>
-            </a:r>
-            <a:r>
-              <a:rPr lang="en-US" dirty="0"/>
-              <a:t> in Java</a:t>
-            </a:r>
-          </a:p>
-        </p:txBody>
-      </p:sp>
-      <p:sp>
-        <p:nvSpPr>
-          <p:cNvPr id="3" name="Content Placeholder 2">
-            <a:extLst>
-              <a:ext uri="{FF2B5EF4-FFF2-40B4-BE49-F238E27FC236}">
-                <a16:creationId xmlns:a16="http://schemas.microsoft.com/office/drawing/2014/main" id="{F8412E51-8D5D-4F83-BD22-57213F43ED38}"/>
-              </a:ext>
-            </a:extLst>
-          </p:cNvPr>
-          <p:cNvSpPr>
-            <a:spLocks noGrp="1"/>
-          </p:cNvSpPr>
-          <p:nvPr>
-            <p:ph idx="1"/>
-          </p:nvPr>
-        </p:nvSpPr>
-        <p:spPr>
-          <a:xfrm>
-            <a:off x="838200" y="1825625"/>
-            <a:ext cx="10515600" cy="4351338"/>
-          </a:xfrm>
-        </p:spPr>
-        <p:txBody>
-          <a:bodyPr/>
-          <a:lstStyle/>
-          <a:p>
-            <a:r>
-              <a:rPr lang="en-US" dirty="0"/>
-              <a:t>View </a:t>
-            </a:r>
-            <a:r>
-              <a:rPr lang="en-US" dirty="0" err="1"/>
-              <a:t>Elemente</a:t>
-            </a:r>
-            <a:r>
-              <a:rPr lang="en-US" dirty="0"/>
-              <a:t> </a:t>
-            </a:r>
-            <a:r>
-              <a:rPr lang="en-US" dirty="0" err="1"/>
-              <a:t>sind</a:t>
-            </a:r>
-            <a:r>
-              <a:rPr lang="en-US" dirty="0"/>
-              <a:t> Java Klassen</a:t>
-            </a:r>
-          </a:p>
-          <a:p>
-            <a:r>
-              <a:rPr lang="en-US" dirty="0" err="1">
-                <a:latin typeface="Consolas" panose="020B0609020204030204" pitchFamily="49" charset="0"/>
-              </a:rPr>
-              <a:t>findViewById</a:t>
-            </a:r>
-            <a:r>
-              <a:rPr lang="en-US" dirty="0">
-                <a:latin typeface="Consolas" panose="020B0609020204030204" pitchFamily="49" charset="0"/>
-              </a:rPr>
-              <a:t>(R.id.{element});</a:t>
-            </a:r>
-          </a:p>
-          <a:p>
-            <a:r>
-              <a:rPr lang="en-US" dirty="0" err="1"/>
-              <a:t>Danach</a:t>
-            </a:r>
-            <a:r>
-              <a:rPr lang="en-US" dirty="0"/>
-              <a:t>: </a:t>
-            </a:r>
-            <a:r>
-              <a:rPr lang="en-US" dirty="0" err="1"/>
-              <a:t>nutzbar</a:t>
-            </a:r>
-            <a:r>
-              <a:rPr lang="en-US" dirty="0"/>
-              <a:t> </a:t>
-            </a:r>
-            <a:r>
-              <a:rPr lang="en-US" dirty="0" err="1"/>
-              <a:t>wie</a:t>
-            </a:r>
-            <a:r>
-              <a:rPr lang="en-US" dirty="0"/>
-              <a:t> </a:t>
-            </a:r>
-            <a:r>
-              <a:rPr lang="en-US" dirty="0" err="1"/>
-              <a:t>normale</a:t>
-            </a:r>
-            <a:r>
-              <a:rPr lang="en-US" dirty="0"/>
-              <a:t> Java </a:t>
-            </a:r>
-            <a:r>
-              <a:rPr lang="en-US" dirty="0" err="1"/>
-              <a:t>Objekte</a:t>
-            </a:r>
-            <a:endParaRPr lang="en-US" dirty="0"/>
-          </a:p>
-          <a:p>
-            <a:endParaRPr lang="en-US" dirty="0"/>
-          </a:p>
-          <a:p>
-            <a:pPr marL="0" indent="0">
-              <a:buNone/>
-            </a:pPr>
-            <a:r>
-              <a:rPr lang="en-US" dirty="0" err="1">
-                <a:latin typeface="Consolas" panose="020B0609020204030204" pitchFamily="49" charset="0"/>
-              </a:rPr>
-              <a:t>TextView</a:t>
-            </a:r>
-            <a:r>
-              <a:rPr lang="en-US" dirty="0">
-                <a:latin typeface="Consolas" panose="020B0609020204030204" pitchFamily="49" charset="0"/>
-              </a:rPr>
-              <a:t> t = </a:t>
-            </a:r>
-            <a:r>
-              <a:rPr lang="en-US" dirty="0" err="1">
-                <a:latin typeface="Consolas" panose="020B0609020204030204" pitchFamily="49" charset="0"/>
-              </a:rPr>
-              <a:t>findViewById</a:t>
-            </a:r>
-            <a:r>
-              <a:rPr lang="en-US" dirty="0">
-                <a:latin typeface="Consolas" panose="020B0609020204030204" pitchFamily="49" charset="0"/>
-              </a:rPr>
-              <a:t>(</a:t>
-            </a:r>
-            <a:r>
-              <a:rPr lang="en-US" dirty="0" err="1">
-                <a:latin typeface="Consolas" panose="020B0609020204030204" pitchFamily="49" charset="0"/>
-              </a:rPr>
-              <a:t>R.id.text</a:t>
-            </a:r>
-            <a:r>
-              <a:rPr lang="en-US" dirty="0">
-                <a:latin typeface="Consolas" panose="020B0609020204030204" pitchFamily="49" charset="0"/>
-              </a:rPr>
-              <a:t>);</a:t>
-            </a:r>
-          </a:p>
-          <a:p>
-            <a:pPr marL="0" indent="0">
-              <a:buNone/>
-            </a:pPr>
-            <a:r>
-              <a:rPr lang="en-US" dirty="0" err="1">
-                <a:latin typeface="Consolas" panose="020B0609020204030204" pitchFamily="49" charset="0"/>
-              </a:rPr>
-              <a:t>t.setText</a:t>
-            </a:r>
-            <a:r>
-              <a:rPr lang="en-US" dirty="0">
-                <a:latin typeface="Consolas" panose="020B0609020204030204" pitchFamily="49" charset="0"/>
-              </a:rPr>
-              <a:t>(“Hello World!”);</a:t>
-            </a:r>
-          </a:p>
-        </p:txBody>
-      </p:sp>
-    </p:spTree>
-    <p:extLst>
-      <p:ext uri="{BB962C8B-B14F-4D97-AF65-F5344CB8AC3E}">
-        <p14:creationId xmlns:p14="http://schemas.microsoft.com/office/powerpoint/2010/main" val="3661144400"/>
-      </p:ext>
-    </p:extLst>
-  </p:cSld>
-  <p:clrMapOvr>
-    <a:masterClrMapping/>
-  </p:clrMapOvr>
-</p:sld>
-</file>
-
 <file path=ppt/slides/slide9.xml><?xml version="1.0" encoding="utf-8"?>
 <p:sld xmlns:a="http://schemas.openxmlformats.org/drawingml/2006/main" xmlns:r="http://schemas.openxmlformats.org/officeDocument/2006/relationships" xmlns:p="http://schemas.openxmlformats.org/presentationml/2006/main">
   <p:cSld>
@@ -6556,7 +8014,7 @@
           <p:cNvPr id="2" name="Title 1">
             <a:extLst>
               <a:ext uri="{FF2B5EF4-FFF2-40B4-BE49-F238E27FC236}">
-                <a16:creationId xmlns:a16="http://schemas.microsoft.com/office/drawing/2014/main" id="{90C381FA-DC0B-41D2-98A8-99331792B92E}"/>
+                <a16:creationId xmlns:a16="http://schemas.microsoft.com/office/drawing/2014/main" id="{92849CA7-5049-4BE3-AC06-AA2547BC08AA}"/>
               </a:ext>
             </a:extLst>
           </p:cNvPr>
@@ -6573,21 +8031,13 @@
           <a:lstStyle/>
           <a:p>
             <a:r>
-              <a:rPr lang="de-DE" dirty="0"/>
-              <a:t>Interaktionen in Java</a:t>
-            </a:r>
-            <a:br>
-              <a:rPr lang="de-DE" dirty="0"/>
-            </a:br>
-            <a:r>
-              <a:rPr lang="de-DE" dirty="0"/>
-              <a:t>- </a:t>
-            </a:r>
-            <a:r>
-              <a:rPr lang="en-US" dirty="0" err="1"/>
-              <a:t>EventListener</a:t>
-            </a:r>
-            <a:endParaRPr lang="de-DE" dirty="0"/>
+              <a:rPr lang="en-US" dirty="0" err="1"/>
+              <a:t>Interaktionen</a:t>
+            </a:r>
+            <a:r>
+              <a:rPr lang="en-US" dirty="0"/>
+              <a:t> in Java</a:t>
+            </a:r>
           </a:p>
         </p:txBody>
       </p:sp>
@@ -6596,7 +8046,7 @@
           <p:cNvPr id="3" name="Content Placeholder 2">
             <a:extLst>
               <a:ext uri="{FF2B5EF4-FFF2-40B4-BE49-F238E27FC236}">
-                <a16:creationId xmlns:a16="http://schemas.microsoft.com/office/drawing/2014/main" id="{2D13B873-782B-4726-BE05-BBFA72161A8E}"/>
+                <a16:creationId xmlns:a16="http://schemas.microsoft.com/office/drawing/2014/main" id="{F8412E51-8D5D-4F83-BD22-57213F43ED38}"/>
               </a:ext>
             </a:extLst>
           </p:cNvPr>
@@ -6609,23 +8059,21 @@
         </p:nvSpPr>
         <p:spPr>
           <a:xfrm>
-            <a:off x="838200" y="1825624"/>
-            <a:ext cx="10515600" cy="5032375"/>
+            <a:off x="838200" y="1825625"/>
+            <a:ext cx="10515600" cy="4351338"/>
           </a:xfrm>
         </p:spPr>
         <p:txBody>
-          <a:bodyPr>
-            <a:normAutofit lnSpcReduction="10000"/>
-          </a:bodyPr>
+          <a:bodyPr/>
           <a:lstStyle/>
           <a:p>
             <a:r>
               <a:rPr lang="en-US" dirty="0"/>
-              <a:t>Ein </a:t>
-            </a:r>
-            <a:r>
-              <a:rPr lang="en-US" dirty="0" err="1"/>
-              <a:t>EventListener</a:t>
+              <a:t>View </a:t>
+            </a:r>
+            <a:r>
+              <a:rPr lang="en-US" dirty="0" err="1"/>
+              <a:t>Elemente</a:t>
             </a:r>
             <a:r>
               <a:rPr lang="en-US" dirty="0"/>
@@ -6633,15 +8081,39 @@
             </a:r>
             <a:r>
               <a:rPr lang="en-US" dirty="0" err="1"/>
-              <a:t>wartet</a:t>
-            </a:r>
-            <a:r>
-              <a:rPr lang="en-US" dirty="0"/>
-              <a:t> bis </a:t>
-            </a:r>
-            <a:r>
-              <a:rPr lang="en-US" dirty="0" err="1"/>
-              <a:t>ein</a:t>
+              <a:t>sind</a:t>
+            </a:r>
+            <a:r>
+              <a:rPr lang="en-US" dirty="0"/>
+              <a:t> Java Klassen</a:t>
+            </a:r>
+          </a:p>
+          <a:p>
+            <a:r>
+              <a:rPr lang="en-US" dirty="0" err="1">
+                <a:latin typeface="Consolas" panose="020B0609020204030204" pitchFamily="49" charset="0"/>
+              </a:rPr>
+              <a:t>findViewById</a:t>
+            </a:r>
+            <a:r>
+              <a:rPr lang="en-US" dirty="0">
+                <a:latin typeface="Consolas" panose="020B0609020204030204" pitchFamily="49" charset="0"/>
+              </a:rPr>
+              <a:t>(R.id.{element});</a:t>
+            </a:r>
+          </a:p>
+          <a:p>
+            <a:r>
+              <a:rPr lang="en-US" dirty="0" err="1"/>
+              <a:t>Danach</a:t>
+            </a:r>
+            <a:r>
+              <a:rPr lang="en-US" dirty="0"/>
+              <a:t>: </a:t>
+            </a:r>
+            <a:r>
+              <a:rPr lang="en-US" dirty="0" err="1"/>
+              <a:t>nutzbar</a:t>
             </a:r>
             <a:r>
               <a:rPr lang="en-US" dirty="0"/>
@@ -6649,15 +8121,7 @@
             </a:r>
             <a:r>
               <a:rPr lang="en-US" dirty="0" err="1"/>
-              <a:t>bestimmtes</a:t>
-            </a:r>
-            <a:r>
-              <a:rPr lang="en-US" dirty="0"/>
-              <a:t> Event </a:t>
-            </a:r>
-            <a:r>
-              <a:rPr lang="en-US" dirty="0" err="1"/>
-              <a:t>ausgelöst</a:t>
+              <a:t>wie</a:t>
             </a:r>
             <a:r>
               <a:rPr lang="en-US" dirty="0"/>
@@ -6665,267 +8129,85 @@
             </a:r>
             <a:r>
               <a:rPr lang="en-US" dirty="0" err="1"/>
-              <a:t>wird</a:t>
-            </a:r>
-            <a:r>
-              <a:rPr lang="en-US" dirty="0"/>
-              <a:t>, um </a:t>
-            </a:r>
-            <a:r>
-              <a:rPr lang="en-US" dirty="0" err="1"/>
-              <a:t>darauf</a:t>
-            </a:r>
-            <a:r>
-              <a:rPr lang="en-US" dirty="0"/>
-              <a:t> </a:t>
-            </a:r>
-            <a:r>
-              <a:rPr lang="en-US" dirty="0" err="1"/>
-              <a:t>zu</a:t>
-            </a:r>
-            <a:r>
-              <a:rPr lang="en-US" dirty="0"/>
-              <a:t> </a:t>
-            </a:r>
-            <a:r>
-              <a:rPr lang="en-US" dirty="0" err="1"/>
-              <a:t>reagieren</a:t>
-            </a:r>
-            <a:r>
-              <a:rPr lang="en-US" dirty="0"/>
-              <a:t>. </a:t>
-            </a:r>
-            <a:r>
-              <a:rPr lang="en-US" dirty="0" err="1"/>
-              <a:t>z.B</a:t>
-            </a:r>
-            <a:r>
-              <a:rPr lang="en-US" dirty="0"/>
-              <a:t>.: Button-Press</a:t>
-            </a:r>
+              <a:t>normale</a:t>
+            </a:r>
+            <a:r>
+              <a:rPr lang="en-US" dirty="0"/>
+              <a:t> Java </a:t>
+            </a:r>
+            <a:r>
+              <a:rPr lang="en-US" dirty="0" err="1"/>
+              <a:t>Objekte</a:t>
+            </a:r>
+            <a:endParaRPr lang="en-US" dirty="0"/>
+          </a:p>
+          <a:p>
+            <a:endParaRPr lang="en-US" dirty="0"/>
           </a:p>
           <a:p>
             <a:pPr marL="0" indent="0">
               <a:buNone/>
             </a:pPr>
-            <a:endParaRPr lang="en-US" dirty="0"/>
+            <a:r>
+              <a:rPr lang="en-US" dirty="0" err="1">
+                <a:latin typeface="Consolas" panose="020B0609020204030204" pitchFamily="49" charset="0"/>
+              </a:rPr>
+              <a:t>TextView</a:t>
+            </a:r>
+            <a:r>
+              <a:rPr lang="en-US" dirty="0">
+                <a:latin typeface="Consolas" panose="020B0609020204030204" pitchFamily="49" charset="0"/>
+              </a:rPr>
+              <a:t> t = </a:t>
+            </a:r>
+            <a:r>
+              <a:rPr lang="en-US" dirty="0" err="1">
+                <a:latin typeface="Consolas" panose="020B0609020204030204" pitchFamily="49" charset="0"/>
+              </a:rPr>
+              <a:t>findViewById</a:t>
+            </a:r>
+            <a:r>
+              <a:rPr lang="en-US" dirty="0">
+                <a:latin typeface="Consolas" panose="020B0609020204030204" pitchFamily="49" charset="0"/>
+              </a:rPr>
+              <a:t>(</a:t>
+            </a:r>
+            <a:r>
+              <a:rPr lang="en-US" dirty="0" err="1">
+                <a:latin typeface="Consolas" panose="020B0609020204030204" pitchFamily="49" charset="0"/>
+              </a:rPr>
+              <a:t>R.id.text</a:t>
+            </a:r>
+            <a:r>
+              <a:rPr lang="en-US" dirty="0">
+                <a:latin typeface="Consolas" panose="020B0609020204030204" pitchFamily="49" charset="0"/>
+              </a:rPr>
+              <a:t>);</a:t>
+            </a:r>
           </a:p>
           <a:p>
             <a:pPr marL="0" indent="0">
               <a:buNone/>
             </a:pPr>
             <a:r>
-              <a:rPr lang="en-US" sz="2400" dirty="0">
+              <a:rPr lang="en-US" dirty="0" err="1">
                 <a:latin typeface="Consolas" panose="020B0609020204030204" pitchFamily="49" charset="0"/>
               </a:rPr>
-              <a:t>Button b = </a:t>
-            </a:r>
-            <a:r>
-              <a:rPr lang="en-US" sz="2400" dirty="0" err="1">
-                <a:latin typeface="Consolas" panose="020B0609020204030204" pitchFamily="49" charset="0"/>
-              </a:rPr>
-              <a:t>findViewById</a:t>
-            </a:r>
-            <a:r>
-              <a:rPr lang="en-US" sz="2400" dirty="0">
-                <a:latin typeface="Consolas" panose="020B0609020204030204" pitchFamily="49" charset="0"/>
-              </a:rPr>
-              <a:t>(</a:t>
-            </a:r>
-            <a:r>
-              <a:rPr lang="en-US" sz="2400" dirty="0" err="1">
-                <a:latin typeface="Consolas" panose="020B0609020204030204" pitchFamily="49" charset="0"/>
-              </a:rPr>
-              <a:t>R.id.button</a:t>
-            </a:r>
-            <a:r>
-              <a:rPr lang="en-US" sz="2400" dirty="0">
-                <a:latin typeface="Consolas" panose="020B0609020204030204" pitchFamily="49" charset="0"/>
-              </a:rPr>
-              <a:t>);</a:t>
-            </a:r>
-          </a:p>
-          <a:p>
-            <a:pPr marL="0" indent="0">
-              <a:buNone/>
-            </a:pPr>
-            <a:r>
-              <a:rPr lang="en-US" sz="2400" dirty="0" err="1">
-                <a:latin typeface="Consolas" panose="020B0609020204030204" pitchFamily="49" charset="0"/>
-              </a:rPr>
-              <a:t>b.setOnClickListener</a:t>
-            </a:r>
-            <a:r>
-              <a:rPr lang="en-US" sz="2400" dirty="0">
-                <a:latin typeface="Consolas" panose="020B0609020204030204" pitchFamily="49" charset="0"/>
-              </a:rPr>
-              <a:t>(new </a:t>
-            </a:r>
-            <a:r>
-              <a:rPr lang="en-US" sz="2400" dirty="0" err="1">
-                <a:latin typeface="Consolas" panose="020B0609020204030204" pitchFamily="49" charset="0"/>
-              </a:rPr>
-              <a:t>View.OnClickListener</a:t>
-            </a:r>
-            <a:r>
-              <a:rPr lang="en-US" sz="2400" dirty="0">
-                <a:latin typeface="Consolas" panose="020B0609020204030204" pitchFamily="49" charset="0"/>
-              </a:rPr>
-              <a:t>() {</a:t>
-            </a:r>
-          </a:p>
-          <a:p>
-            <a:pPr marL="457200" lvl="1" indent="0">
-              <a:buNone/>
-            </a:pPr>
+              <a:t>t.setText</a:t>
+            </a:r>
             <a:r>
               <a:rPr lang="en-US" dirty="0">
                 <a:latin typeface="Consolas" panose="020B0609020204030204" pitchFamily="49" charset="0"/>
               </a:rPr>
-              <a:t>@Override</a:t>
-            </a:r>
-          </a:p>
-          <a:p>
-            <a:pPr marL="457200" lvl="1" indent="0">
-              <a:buNone/>
-            </a:pPr>
-            <a:r>
-              <a:rPr lang="en-US" dirty="0">
-                <a:latin typeface="Consolas" panose="020B0609020204030204" pitchFamily="49" charset="0"/>
-              </a:rPr>
-              <a:t>public void </a:t>
-            </a:r>
-            <a:r>
-              <a:rPr lang="en-US" dirty="0" err="1">
-                <a:latin typeface="Consolas" panose="020B0609020204030204" pitchFamily="49" charset="0"/>
-              </a:rPr>
-              <a:t>onClick</a:t>
-            </a:r>
-            <a:r>
-              <a:rPr lang="en-US" dirty="0">
-                <a:latin typeface="Consolas" panose="020B0609020204030204" pitchFamily="49" charset="0"/>
-              </a:rPr>
-              <a:t>(View view) {</a:t>
-            </a:r>
-          </a:p>
-          <a:p>
-            <a:pPr marL="914400" lvl="2" indent="0">
-              <a:buNone/>
-            </a:pPr>
-            <a:r>
-              <a:rPr lang="en-US" sz="2400" dirty="0" err="1">
-                <a:latin typeface="Consolas" panose="020B0609020204030204" pitchFamily="49" charset="0"/>
-              </a:rPr>
-              <a:t>TextView</a:t>
-            </a:r>
-            <a:r>
-              <a:rPr lang="en-US" sz="2400" dirty="0">
-                <a:latin typeface="Consolas" panose="020B0609020204030204" pitchFamily="49" charset="0"/>
-              </a:rPr>
-              <a:t> t = </a:t>
-            </a:r>
-            <a:r>
-              <a:rPr lang="en-US" sz="2400" dirty="0" err="1">
-                <a:latin typeface="Consolas" panose="020B0609020204030204" pitchFamily="49" charset="0"/>
-              </a:rPr>
-              <a:t>findViewById</a:t>
-            </a:r>
-            <a:r>
-              <a:rPr lang="en-US" sz="2400" dirty="0">
-                <a:latin typeface="Consolas" panose="020B0609020204030204" pitchFamily="49" charset="0"/>
-              </a:rPr>
-              <a:t>(</a:t>
-            </a:r>
-            <a:r>
-              <a:rPr lang="en-US" sz="2400" dirty="0" err="1">
-                <a:latin typeface="Consolas" panose="020B0609020204030204" pitchFamily="49" charset="0"/>
-              </a:rPr>
-              <a:t>R.id.text</a:t>
-            </a:r>
-            <a:r>
-              <a:rPr lang="en-US" sz="2400" dirty="0">
-                <a:latin typeface="Consolas" panose="020B0609020204030204" pitchFamily="49" charset="0"/>
-              </a:rPr>
-              <a:t>);</a:t>
-            </a:r>
-          </a:p>
-          <a:p>
-            <a:pPr marL="914400" lvl="2" indent="0">
-              <a:buNone/>
-            </a:pPr>
-            <a:r>
-              <a:rPr lang="en-US" sz="2400" dirty="0" err="1">
-                <a:latin typeface="Consolas" panose="020B0609020204030204" pitchFamily="49" charset="0"/>
-              </a:rPr>
-              <a:t>t.setText</a:t>
-            </a:r>
-            <a:r>
-              <a:rPr lang="en-US" sz="2400" dirty="0">
-                <a:latin typeface="Consolas" panose="020B0609020204030204" pitchFamily="49" charset="0"/>
-              </a:rPr>
-              <a:t>("CLICKED");</a:t>
-            </a:r>
-          </a:p>
-          <a:p>
-            <a:pPr marL="0" indent="0">
-              <a:buNone/>
-            </a:pPr>
-            <a:r>
-              <a:rPr lang="en-US" sz="2400" dirty="0">
-                <a:latin typeface="Consolas" panose="020B0609020204030204" pitchFamily="49" charset="0"/>
-              </a:rPr>
-              <a:t>}});</a:t>
-            </a:r>
-          </a:p>
-          <a:p>
-            <a:pPr marL="0" indent="0">
-              <a:buNone/>
-            </a:pPr>
-            <a:endParaRPr lang="en-US" sz="2400" dirty="0"/>
-          </a:p>
-          <a:p>
-            <a:r>
-              <a:rPr lang="en-US" dirty="0"/>
-              <a:t>Wie </a:t>
-            </a:r>
-            <a:r>
-              <a:rPr lang="en-US" dirty="0" err="1"/>
-              <a:t>wird</a:t>
-            </a:r>
-            <a:r>
-              <a:rPr lang="en-US" dirty="0"/>
-              <a:t> so </a:t>
-            </a:r>
-            <a:r>
-              <a:rPr lang="en-US" dirty="0" err="1"/>
-              <a:t>etwas</a:t>
-            </a:r>
-            <a:r>
-              <a:rPr lang="en-US" dirty="0"/>
-              <a:t> </a:t>
-            </a:r>
-            <a:r>
-              <a:rPr lang="en-US" dirty="0" err="1"/>
-              <a:t>implementiert</a:t>
-            </a:r>
-            <a:r>
-              <a:rPr lang="en-US" dirty="0"/>
-              <a:t>? -&gt; </a:t>
-            </a:r>
-            <a:r>
-              <a:rPr lang="de-DE" dirty="0">
-                <a:hlinkClick r:id="rId2"/>
-              </a:rPr>
-              <a:t>observer pattern</a:t>
-            </a:r>
-            <a:endParaRPr lang="de-DE" dirty="0"/>
+              <a:t>(“Hello World!”);</a:t>
+            </a:r>
           </a:p>
         </p:txBody>
       </p:sp>
     </p:spTree>
     <p:extLst>
       <p:ext uri="{BB962C8B-B14F-4D97-AF65-F5344CB8AC3E}">
-        <p14:creationId xmlns:p14="http://schemas.microsoft.com/office/powerpoint/2010/main" val="324301655"/>
+        <p14:creationId xmlns:p14="http://schemas.microsoft.com/office/powerpoint/2010/main" val="3661144400"/>
       </p:ext>
     </p:extLst>
   </p:cSld>

</xml_diff>

<commit_message>
added: final version of android ui presentation
</commit_message>
<xml_diff>
--- a/Android_UI.pptx
+++ b/Android_UI.pptx
@@ -19,10 +19,12 @@
     <p:sldId id="272" r:id="rId13"/>
     <p:sldId id="263" r:id="rId14"/>
     <p:sldId id="267" r:id="rId15"/>
-    <p:sldId id="269" r:id="rId16"/>
-    <p:sldId id="274" r:id="rId17"/>
-    <p:sldId id="277" r:id="rId18"/>
-    <p:sldId id="264" r:id="rId19"/>
+    <p:sldId id="279" r:id="rId16"/>
+    <p:sldId id="269" r:id="rId17"/>
+    <p:sldId id="278" r:id="rId18"/>
+    <p:sldId id="277" r:id="rId19"/>
+    <p:sldId id="264" r:id="rId20"/>
+    <p:sldId id="280" r:id="rId21"/>
   </p:sldIdLst>
   <p:sldSz cx="12192000" cy="6858000"/>
   <p:notesSz cx="6858000" cy="9144000"/>
@@ -278,7 +280,7 @@
           <a:p>
             <a:fld id="{919E3548-B54C-4660-A496-DDF0181B025A}" type="datetimeFigureOut">
               <a:rPr lang="de-DE" smtClean="0"/>
-              <a:t>04.11.2019</a:t>
+              <a:t>06.11.2019</a:t>
             </a:fld>
             <a:endParaRPr lang="de-DE"/>
           </a:p>
@@ -478,7 +480,7 @@
           <a:p>
             <a:fld id="{919E3548-B54C-4660-A496-DDF0181B025A}" type="datetimeFigureOut">
               <a:rPr lang="de-DE" smtClean="0"/>
-              <a:t>04.11.2019</a:t>
+              <a:t>06.11.2019</a:t>
             </a:fld>
             <a:endParaRPr lang="de-DE"/>
           </a:p>
@@ -688,7 +690,7 @@
           <a:p>
             <a:fld id="{919E3548-B54C-4660-A496-DDF0181B025A}" type="datetimeFigureOut">
               <a:rPr lang="de-DE" smtClean="0"/>
-              <a:t>04.11.2019</a:t>
+              <a:t>06.11.2019</a:t>
             </a:fld>
             <a:endParaRPr lang="de-DE"/>
           </a:p>
@@ -888,7 +890,7 @@
           <a:p>
             <a:fld id="{919E3548-B54C-4660-A496-DDF0181B025A}" type="datetimeFigureOut">
               <a:rPr lang="de-DE" smtClean="0"/>
-              <a:t>04.11.2019</a:t>
+              <a:t>06.11.2019</a:t>
             </a:fld>
             <a:endParaRPr lang="de-DE"/>
           </a:p>
@@ -1164,7 +1166,7 @@
           <a:p>
             <a:fld id="{919E3548-B54C-4660-A496-DDF0181B025A}" type="datetimeFigureOut">
               <a:rPr lang="de-DE" smtClean="0"/>
-              <a:t>04.11.2019</a:t>
+              <a:t>06.11.2019</a:t>
             </a:fld>
             <a:endParaRPr lang="de-DE"/>
           </a:p>
@@ -1432,7 +1434,7 @@
           <a:p>
             <a:fld id="{919E3548-B54C-4660-A496-DDF0181B025A}" type="datetimeFigureOut">
               <a:rPr lang="de-DE" smtClean="0"/>
-              <a:t>04.11.2019</a:t>
+              <a:t>06.11.2019</a:t>
             </a:fld>
             <a:endParaRPr lang="de-DE"/>
           </a:p>
@@ -1847,7 +1849,7 @@
           <a:p>
             <a:fld id="{919E3548-B54C-4660-A496-DDF0181B025A}" type="datetimeFigureOut">
               <a:rPr lang="de-DE" smtClean="0"/>
-              <a:t>04.11.2019</a:t>
+              <a:t>06.11.2019</a:t>
             </a:fld>
             <a:endParaRPr lang="de-DE"/>
           </a:p>
@@ -1989,7 +1991,7 @@
           <a:p>
             <a:fld id="{919E3548-B54C-4660-A496-DDF0181B025A}" type="datetimeFigureOut">
               <a:rPr lang="de-DE" smtClean="0"/>
-              <a:t>04.11.2019</a:t>
+              <a:t>06.11.2019</a:t>
             </a:fld>
             <a:endParaRPr lang="de-DE"/>
           </a:p>
@@ -2102,7 +2104,7 @@
           <a:p>
             <a:fld id="{919E3548-B54C-4660-A496-DDF0181B025A}" type="datetimeFigureOut">
               <a:rPr lang="de-DE" smtClean="0"/>
-              <a:t>04.11.2019</a:t>
+              <a:t>06.11.2019</a:t>
             </a:fld>
             <a:endParaRPr lang="de-DE"/>
           </a:p>
@@ -2415,7 +2417,7 @@
           <a:p>
             <a:fld id="{919E3548-B54C-4660-A496-DDF0181B025A}" type="datetimeFigureOut">
               <a:rPr lang="de-DE" smtClean="0"/>
-              <a:t>04.11.2019</a:t>
+              <a:t>06.11.2019</a:t>
             </a:fld>
             <a:endParaRPr lang="de-DE"/>
           </a:p>
@@ -2704,7 +2706,7 @@
           <a:p>
             <a:fld id="{919E3548-B54C-4660-A496-DDF0181B025A}" type="datetimeFigureOut">
               <a:rPr lang="de-DE" smtClean="0"/>
-              <a:t>04.11.2019</a:t>
+              <a:t>06.11.2019</a:t>
             </a:fld>
             <a:endParaRPr lang="de-DE"/>
           </a:p>
@@ -2947,7 +2949,7 @@
           <a:p>
             <a:fld id="{919E3548-B54C-4660-A496-DDF0181B025A}" type="datetimeFigureOut">
               <a:rPr lang="de-DE" smtClean="0"/>
-              <a:t>04.11.2019</a:t>
+              <a:t>06.11.2019</a:t>
             </a:fld>
             <a:endParaRPr lang="de-DE"/>
           </a:p>
@@ -3466,7 +3468,7 @@
             </a:r>
             <a:r>
               <a:rPr lang="en-US" dirty="0"/>
-              <a:t> Code </a:t>
+              <a:t> Code-</a:t>
             </a:r>
             <a:r>
               <a:rPr lang="en-US" dirty="0" err="1"/>
@@ -3487,8 +3489,12 @@
           </a:p>
           <a:p>
             <a:r>
-              <a:rPr lang="en-US" dirty="0"/>
-              <a:t>Tab </a:t>
+              <a:rPr lang="en-US" i="1" dirty="0"/>
+              <a:t>Tab</a:t>
+            </a:r>
+            <a:r>
+              <a:rPr lang="en-US" dirty="0"/>
+              <a:t> </a:t>
             </a:r>
             <a:r>
               <a:rPr lang="en-US" dirty="0" err="1"/>
@@ -3551,7 +3557,15 @@
             </a:r>
             <a:r>
               <a:rPr lang="en-US" dirty="0"/>
-              <a:t> warden!</a:t>
+              <a:t> </a:t>
+            </a:r>
+            <a:r>
+              <a:rPr lang="en-US" dirty="0" err="1"/>
+              <a:t>werden</a:t>
+            </a:r>
+            <a:r>
+              <a:rPr lang="en-US" dirty="0"/>
+              <a:t>!</a:t>
             </a:r>
           </a:p>
         </p:txBody>
@@ -5580,12 +5594,12 @@
         <p:spPr>
           <a:xfrm>
             <a:off x="838200" y="1825625"/>
-            <a:ext cx="10515600" cy="984077"/>
+            <a:ext cx="10515600" cy="1603375"/>
           </a:xfrm>
         </p:spPr>
         <p:txBody>
           <a:bodyPr>
-            <a:normAutofit lnSpcReduction="10000"/>
+            <a:normAutofit/>
           </a:bodyPr>
           <a:lstStyle/>
           <a:p>
@@ -5640,6 +5654,36 @@
             <a:r>
               <a:rPr lang="en-US" dirty="0" err="1"/>
               <a:t>sind</a:t>
+            </a:r>
+            <a:endParaRPr lang="en-US" dirty="0"/>
+          </a:p>
+          <a:p>
+            <a:pPr marL="0" indent="0">
+              <a:buNone/>
+            </a:pPr>
+            <a:r>
+              <a:rPr lang="en-US" dirty="0"/>
+              <a:t>-&gt; </a:t>
+            </a:r>
+            <a:r>
+              <a:rPr lang="en-US" dirty="0" err="1"/>
+              <a:t>Effizienter</a:t>
+            </a:r>
+            <a:r>
+              <a:rPr lang="en-US" dirty="0"/>
+              <a:t> </a:t>
+            </a:r>
+            <a:r>
+              <a:rPr lang="en-US" dirty="0" err="1"/>
+              <a:t>als</a:t>
+            </a:r>
+            <a:r>
+              <a:rPr lang="en-US" dirty="0"/>
+              <a:t> </a:t>
+            </a:r>
+            <a:r>
+              <a:rPr lang="en-US" dirty="0" err="1"/>
+              <a:t>ListView</a:t>
             </a:r>
             <a:endParaRPr lang="en-US" dirty="0"/>
           </a:p>
@@ -5741,10 +5785,10 @@
       </p:sp>
       <p:sp>
         <p:nvSpPr>
-          <p:cNvPr id="5" name="Content Placeholder 2">
-            <a:extLst>
-              <a:ext uri="{FF2B5EF4-FFF2-40B4-BE49-F238E27FC236}">
-                <a16:creationId xmlns:a16="http://schemas.microsoft.com/office/drawing/2014/main" id="{189D7E03-F783-4527-84D4-9C90EA80F381}"/>
+          <p:cNvPr id="6" name="Content Placeholder 2">
+            <a:extLst>
+              <a:ext uri="{FF2B5EF4-FFF2-40B4-BE49-F238E27FC236}">
+                <a16:creationId xmlns:a16="http://schemas.microsoft.com/office/drawing/2014/main" id="{8C134E31-0B72-438A-AF14-4549DC0E88F7}"/>
               </a:ext>
             </a:extLst>
           </p:cNvPr>
@@ -5755,8 +5799,8 @@
         </p:nvSpPr>
         <p:spPr>
           <a:xfrm>
-            <a:off x="838200" y="5192885"/>
-            <a:ext cx="10515600" cy="984077"/>
+            <a:off x="838200" y="4577900"/>
+            <a:ext cx="10515600" cy="1603375"/>
           </a:xfrm>
           <a:prstGeom prst="rect">
             <a:avLst/>
@@ -5931,7 +5975,28 @@
             </a:lvl9pPr>
           </a:lstStyle>
           <a:p>
-            <a:endParaRPr lang="en-US" dirty="0"/>
+            <a:r>
+              <a:rPr lang="en-US" dirty="0" err="1">
+                <a:latin typeface="Consolas" panose="020B0609020204030204" pitchFamily="49" charset="0"/>
+              </a:rPr>
+              <a:t>findViewById</a:t>
+            </a:r>
+            <a:r>
+              <a:rPr lang="en-US" dirty="0"/>
+              <a:t> is expensive (DOM parsing)</a:t>
+            </a:r>
+          </a:p>
+          <a:p>
+            <a:r>
+              <a:rPr lang="en-US" dirty="0"/>
+              <a:t>assigns / updates the data in the view items</a:t>
+            </a:r>
+          </a:p>
+          <a:p>
+            <a:r>
+              <a:rPr lang="en-US" dirty="0"/>
+              <a:t>view is re-used -&gt; previous data is overwritten</a:t>
+            </a:r>
           </a:p>
         </p:txBody>
       </p:sp>
@@ -5965,88 +6030,46 @@
           <a:chExt cx="0" cy="0"/>
         </a:xfrm>
       </p:grpSpPr>
-      <p:sp>
-        <p:nvSpPr>
-          <p:cNvPr id="2" name="Title 1">
-            <a:extLst>
-              <a:ext uri="{FF2B5EF4-FFF2-40B4-BE49-F238E27FC236}">
-                <a16:creationId xmlns:a16="http://schemas.microsoft.com/office/drawing/2014/main" id="{D87AA48D-DFFD-4D4F-943C-3DD94A8DDCDD}"/>
-              </a:ext>
-            </a:extLst>
-          </p:cNvPr>
-          <p:cNvSpPr>
-            <a:spLocks noGrp="1"/>
-          </p:cNvSpPr>
-          <p:nvPr>
-            <p:ph type="title"/>
-          </p:nvPr>
-        </p:nvSpPr>
-        <p:spPr/>
-        <p:txBody>
-          <a:bodyPr/>
-          <a:lstStyle/>
-          <a:p>
-            <a:r>
-              <a:rPr lang="en-US" dirty="0"/>
-              <a:t>Adapter</a:t>
-            </a:r>
-          </a:p>
-        </p:txBody>
-      </p:sp>
-      <p:sp>
-        <p:nvSpPr>
-          <p:cNvPr id="3" name="Content Placeholder 2">
-            <a:extLst>
-              <a:ext uri="{FF2B5EF4-FFF2-40B4-BE49-F238E27FC236}">
-                <a16:creationId xmlns:a16="http://schemas.microsoft.com/office/drawing/2014/main" id="{F48567FF-33D1-4DDD-B9B3-F583238B1DE7}"/>
-              </a:ext>
-            </a:extLst>
-          </p:cNvPr>
-          <p:cNvSpPr>
-            <a:spLocks noGrp="1"/>
-          </p:cNvSpPr>
-          <p:nvPr>
-            <p:ph idx="1"/>
-          </p:nvPr>
-        </p:nvSpPr>
-        <p:spPr/>
-        <p:txBody>
-          <a:bodyPr/>
-          <a:lstStyle/>
-          <a:p>
-            <a:r>
-              <a:rPr lang="en-US" dirty="0"/>
-              <a:t>connect our data to our </a:t>
-            </a:r>
-            <a:r>
-              <a:rPr lang="en-US" dirty="0" err="1"/>
-              <a:t>RecyclerView</a:t>
-            </a:r>
-            <a:r>
-              <a:rPr lang="en-US" dirty="0"/>
-              <a:t> and determine the </a:t>
-            </a:r>
-            <a:r>
-              <a:rPr lang="en-US" dirty="0" err="1"/>
-              <a:t>ViewHolder</a:t>
-            </a:r>
-            <a:r>
-              <a:rPr lang="en-US" dirty="0"/>
-              <a:t>(s) which will need to be used to display that data. </a:t>
-            </a:r>
-          </a:p>
-          <a:p>
-            <a:r>
-              <a:rPr lang="en-US" dirty="0"/>
-              <a:t>separation of concerns principle: and consider it best practice to make the adapter as “dumb” as possible.</a:t>
-            </a:r>
-          </a:p>
-        </p:txBody>
-      </p:sp>
+      <p:pic>
+        <p:nvPicPr>
+          <p:cNvPr id="5" name="Picture 4">
+            <a:extLst>
+              <a:ext uri="{FF2B5EF4-FFF2-40B4-BE49-F238E27FC236}">
+                <a16:creationId xmlns:a16="http://schemas.microsoft.com/office/drawing/2014/main" id="{3E37FB54-A7C3-46D7-83AF-C8B3BBC80A40}"/>
+              </a:ext>
+            </a:extLst>
+          </p:cNvPr>
+          <p:cNvPicPr>
+            <a:picLocks noChangeAspect="1"/>
+          </p:cNvPicPr>
+          <p:nvPr/>
+        </p:nvPicPr>
+        <p:blipFill>
+          <a:blip r:embed="rId2">
+            <a:extLst>
+              <a:ext uri="{28A0092B-C50C-407E-A947-70E740481C1C}">
+                <a14:useLocalDpi xmlns:a14="http://schemas.microsoft.com/office/drawing/2010/main" val="0"/>
+              </a:ext>
+            </a:extLst>
+          </a:blip>
+          <a:stretch>
+            <a:fillRect/>
+          </a:stretch>
+        </p:blipFill>
+        <p:spPr>
+          <a:xfrm>
+            <a:off x="0" y="0"/>
+            <a:ext cx="12192000" cy="6858000"/>
+          </a:xfrm>
+          <a:prstGeom prst="rect">
+            <a:avLst/>
+          </a:prstGeom>
+        </p:spPr>
+      </p:pic>
     </p:spTree>
     <p:extLst>
       <p:ext uri="{BB962C8B-B14F-4D97-AF65-F5344CB8AC3E}">
-        <p14:creationId xmlns:p14="http://schemas.microsoft.com/office/powerpoint/2010/main" val="3848375840"/>
+        <p14:creationId xmlns:p14="http://schemas.microsoft.com/office/powerpoint/2010/main" val="3504569774"/>
       </p:ext>
     </p:extLst>
   </p:cSld>
@@ -6078,7 +6101,7 @@
           <p:cNvPr id="2" name="Title 1">
             <a:extLst>
               <a:ext uri="{FF2B5EF4-FFF2-40B4-BE49-F238E27FC236}">
-                <a16:creationId xmlns:a16="http://schemas.microsoft.com/office/drawing/2014/main" id="{D1EB0F63-AB25-4BD1-A03A-9D1A17A6C00C}"/>
+                <a16:creationId xmlns:a16="http://schemas.microsoft.com/office/drawing/2014/main" id="{D87AA48D-DFFD-4D4F-943C-3DD94A8DDCDD}"/>
               </a:ext>
             </a:extLst>
           </p:cNvPr>
@@ -6096,75 +6119,49 @@
           <a:p>
             <a:r>
               <a:rPr lang="en-US" dirty="0"/>
-              <a:t>Wie </a:t>
-            </a:r>
-            <a:r>
-              <a:rPr lang="en-US" dirty="0" err="1"/>
-              <a:t>hängen</a:t>
-            </a:r>
-            <a:r>
-              <a:rPr lang="en-US" dirty="0"/>
-              <a:t> die </a:t>
-            </a:r>
-            <a:r>
-              <a:rPr lang="en-US" dirty="0" err="1"/>
-              <a:t>Komponenten</a:t>
-            </a:r>
-            <a:r>
-              <a:rPr lang="en-US" dirty="0"/>
-              <a:t> </a:t>
-            </a:r>
-            <a:r>
-              <a:rPr lang="en-US" dirty="0" err="1"/>
-              <a:t>zusammen</a:t>
-            </a:r>
-            <a:r>
-              <a:rPr lang="en-US" dirty="0"/>
-              <a:t>?</a:t>
-            </a:r>
-          </a:p>
-        </p:txBody>
-      </p:sp>
-      <p:pic>
-        <p:nvPicPr>
-          <p:cNvPr id="8" name="Picture 7">
-            <a:extLst>
-              <a:ext uri="{FF2B5EF4-FFF2-40B4-BE49-F238E27FC236}">
-                <a16:creationId xmlns:a16="http://schemas.microsoft.com/office/drawing/2014/main" id="{EA148EA3-CB6E-4D38-871A-87D2BF79E0F8}"/>
-              </a:ext>
-            </a:extLst>
-          </p:cNvPr>
-          <p:cNvPicPr>
-            <a:picLocks noChangeAspect="1"/>
-          </p:cNvPicPr>
-          <p:nvPr/>
-        </p:nvPicPr>
-        <p:blipFill>
-          <a:blip r:embed="rId2">
-            <a:extLst>
-              <a:ext uri="{28A0092B-C50C-407E-A947-70E740481C1C}">
-                <a14:useLocalDpi xmlns:a14="http://schemas.microsoft.com/office/drawing/2010/main" val="0"/>
-              </a:ext>
-            </a:extLst>
-          </a:blip>
-          <a:stretch>
-            <a:fillRect/>
-          </a:stretch>
-        </p:blipFill>
-        <p:spPr>
-          <a:xfrm>
-            <a:off x="629634" y="2935171"/>
-            <a:ext cx="10932732" cy="2114237"/>
-          </a:xfrm>
-          <a:prstGeom prst="rect">
-            <a:avLst/>
-          </a:prstGeom>
-        </p:spPr>
-      </p:pic>
+              <a:t>Adapter</a:t>
+            </a:r>
+          </a:p>
+        </p:txBody>
+      </p:sp>
+      <p:sp>
+        <p:nvSpPr>
+          <p:cNvPr id="3" name="Content Placeholder 2">
+            <a:extLst>
+              <a:ext uri="{FF2B5EF4-FFF2-40B4-BE49-F238E27FC236}">
+                <a16:creationId xmlns:a16="http://schemas.microsoft.com/office/drawing/2014/main" id="{F48567FF-33D1-4DDD-B9B3-F583238B1DE7}"/>
+              </a:ext>
+            </a:extLst>
+          </p:cNvPr>
+          <p:cNvSpPr>
+            <a:spLocks noGrp="1"/>
+          </p:cNvSpPr>
+          <p:nvPr>
+            <p:ph idx="1"/>
+          </p:nvPr>
+        </p:nvSpPr>
+        <p:spPr/>
+        <p:txBody>
+          <a:bodyPr/>
+          <a:lstStyle/>
+          <a:p>
+            <a:r>
+              <a:rPr lang="en-US" dirty="0"/>
+              <a:t>Gets the data</a:t>
+            </a:r>
+          </a:p>
+          <a:p>
+            <a:r>
+              <a:rPr lang="en-US" dirty="0"/>
+              <a:t>creates or updates the individual items in the list</a:t>
+            </a:r>
+          </a:p>
+        </p:txBody>
+      </p:sp>
     </p:spTree>
     <p:extLst>
       <p:ext uri="{BB962C8B-B14F-4D97-AF65-F5344CB8AC3E}">
-        <p14:creationId xmlns:p14="http://schemas.microsoft.com/office/powerpoint/2010/main" val="1116550077"/>
+        <p14:creationId xmlns:p14="http://schemas.microsoft.com/office/powerpoint/2010/main" val="3848375840"/>
       </p:ext>
     </p:extLst>
   </p:cSld>
@@ -6175,6 +6172,71 @@
 </file>
 
 <file path=ppt/slides/slide17.xml><?xml version="1.0" encoding="utf-8"?>
+<p:sld xmlns:a="http://schemas.openxmlformats.org/drawingml/2006/main" xmlns:r="http://schemas.openxmlformats.org/officeDocument/2006/relationships" xmlns:p="http://schemas.openxmlformats.org/presentationml/2006/main">
+  <p:cSld>
+    <p:spTree>
+      <p:nvGrpSpPr>
+        <p:cNvPr id="1" name=""/>
+        <p:cNvGrpSpPr/>
+        <p:nvPr/>
+      </p:nvGrpSpPr>
+      <p:grpSpPr>
+        <a:xfrm>
+          <a:off x="0" y="0"/>
+          <a:ext cx="0" cy="0"/>
+          <a:chOff x="0" y="0"/>
+          <a:chExt cx="0" cy="0"/>
+        </a:xfrm>
+      </p:grpSpPr>
+      <p:pic>
+        <p:nvPicPr>
+          <p:cNvPr id="5" name="Content Placeholder 4">
+            <a:extLst>
+              <a:ext uri="{FF2B5EF4-FFF2-40B4-BE49-F238E27FC236}">
+                <a16:creationId xmlns:a16="http://schemas.microsoft.com/office/drawing/2014/main" id="{4B994ED7-9F11-4DB6-A1B7-BE78BB3D28EE}"/>
+              </a:ext>
+            </a:extLst>
+          </p:cNvPr>
+          <p:cNvPicPr>
+            <a:picLocks noGrp="1" noChangeAspect="1"/>
+          </p:cNvPicPr>
+          <p:nvPr>
+            <p:ph idx="1"/>
+          </p:nvPr>
+        </p:nvPicPr>
+        <p:blipFill>
+          <a:blip r:embed="rId2">
+            <a:extLst>
+              <a:ext uri="{28A0092B-C50C-407E-A947-70E740481C1C}">
+                <a14:useLocalDpi xmlns:a14="http://schemas.microsoft.com/office/drawing/2010/main" val="0"/>
+              </a:ext>
+            </a:extLst>
+          </a:blip>
+          <a:stretch>
+            <a:fillRect/>
+          </a:stretch>
+        </p:blipFill>
+        <p:spPr>
+          <a:xfrm>
+            <a:off x="0" y="0"/>
+            <a:ext cx="12192000" cy="6858000"/>
+          </a:xfrm>
+        </p:spPr>
+      </p:pic>
+    </p:spTree>
+    <p:extLst>
+      <p:ext uri="{BB962C8B-B14F-4D97-AF65-F5344CB8AC3E}">
+        <p14:creationId xmlns:p14="http://schemas.microsoft.com/office/powerpoint/2010/main" val="2980827014"/>
+      </p:ext>
+    </p:extLst>
+  </p:cSld>
+  <p:clrMapOvr>
+    <a:masterClrMapping/>
+  </p:clrMapOvr>
+</p:sld>
+</file>
+
+<file path=ppt/slides/slide18.xml><?xml version="1.0" encoding="utf-8"?>
 <p:sld xmlns:a="http://schemas.openxmlformats.org/drawingml/2006/main" xmlns:r="http://schemas.openxmlformats.org/officeDocument/2006/relationships" xmlns:p="http://schemas.openxmlformats.org/presentationml/2006/main" show="0">
   <p:cSld>
     <p:spTree>
@@ -6455,7 +6517,7 @@
 </p:sld>
 </file>
 
-<file path=ppt/slides/slide18.xml><?xml version="1.0" encoding="utf-8"?>
+<file path=ppt/slides/slide19.xml><?xml version="1.0" encoding="utf-8"?>
 <p:sld xmlns:a="http://schemas.openxmlformats.org/drawingml/2006/main" xmlns:r="http://schemas.openxmlformats.org/officeDocument/2006/relationships" xmlns:p="http://schemas.openxmlformats.org/presentationml/2006/main">
   <p:cSld>
     <p:spTree>
@@ -6649,6 +6711,177 @@
 </p:sld>
 </file>
 
+<file path=ppt/slides/slide20.xml><?xml version="1.0" encoding="utf-8"?>
+<p:sld xmlns:a="http://schemas.openxmlformats.org/drawingml/2006/main" xmlns:r="http://schemas.openxmlformats.org/officeDocument/2006/relationships" xmlns:p="http://schemas.openxmlformats.org/presentationml/2006/main">
+  <p:cSld>
+    <p:spTree>
+      <p:nvGrpSpPr>
+        <p:cNvPr id="1" name=""/>
+        <p:cNvGrpSpPr/>
+        <p:nvPr/>
+      </p:nvGrpSpPr>
+      <p:grpSpPr>
+        <a:xfrm>
+          <a:off x="0" y="0"/>
+          <a:ext cx="0" cy="0"/>
+          <a:chOff x="0" y="0"/>
+          <a:chExt cx="0" cy="0"/>
+        </a:xfrm>
+      </p:grpSpPr>
+      <p:sp>
+        <p:nvSpPr>
+          <p:cNvPr id="2" name="Title 1">
+            <a:extLst>
+              <a:ext uri="{FF2B5EF4-FFF2-40B4-BE49-F238E27FC236}">
+                <a16:creationId xmlns:a16="http://schemas.microsoft.com/office/drawing/2014/main" id="{4062B182-B58B-4C7F-9DD9-1CE9EA47F5EA}"/>
+              </a:ext>
+            </a:extLst>
+          </p:cNvPr>
+          <p:cNvSpPr>
+            <a:spLocks noGrp="1"/>
+          </p:cNvSpPr>
+          <p:nvPr>
+            <p:ph type="title"/>
+          </p:nvPr>
+        </p:nvSpPr>
+        <p:spPr/>
+        <p:txBody>
+          <a:bodyPr/>
+          <a:lstStyle/>
+          <a:p>
+            <a:r>
+              <a:rPr lang="en-US" dirty="0" err="1"/>
+              <a:t>Weiterführende</a:t>
+            </a:r>
+            <a:r>
+              <a:rPr lang="en-US" dirty="0"/>
+              <a:t> Links</a:t>
+            </a:r>
+          </a:p>
+        </p:txBody>
+      </p:sp>
+      <p:sp>
+        <p:nvSpPr>
+          <p:cNvPr id="3" name="Content Placeholder 2">
+            <a:extLst>
+              <a:ext uri="{FF2B5EF4-FFF2-40B4-BE49-F238E27FC236}">
+                <a16:creationId xmlns:a16="http://schemas.microsoft.com/office/drawing/2014/main" id="{9B2F3E2F-785E-439E-8930-7D9B9BB943FD}"/>
+              </a:ext>
+            </a:extLst>
+          </p:cNvPr>
+          <p:cNvSpPr>
+            <a:spLocks noGrp="1"/>
+          </p:cNvSpPr>
+          <p:nvPr>
+            <p:ph idx="1"/>
+          </p:nvPr>
+        </p:nvSpPr>
+        <p:spPr/>
+        <p:txBody>
+          <a:bodyPr/>
+          <a:lstStyle/>
+          <a:p>
+            <a:r>
+              <a:rPr lang="en-US" dirty="0" err="1"/>
+              <a:t>Dokumentation</a:t>
+            </a:r>
+            <a:r>
+              <a:rPr lang="en-US" dirty="0"/>
+              <a:t>:</a:t>
+            </a:r>
+          </a:p>
+          <a:p>
+            <a:pPr lvl="1"/>
+            <a:r>
+              <a:rPr lang="en-US" dirty="0">
+                <a:hlinkClick r:id="rId2"/>
+              </a:rPr>
+              <a:t>https://developer.android.com/docs/</a:t>
+            </a:r>
+            <a:endParaRPr lang="en-US" dirty="0"/>
+          </a:p>
+          <a:p>
+            <a:r>
+              <a:rPr lang="en-US" dirty="0" err="1"/>
+              <a:t>Fragen</a:t>
+            </a:r>
+            <a:r>
+              <a:rPr lang="en-US" dirty="0"/>
+              <a:t> / </a:t>
+            </a:r>
+            <a:r>
+              <a:rPr lang="en-US" dirty="0" err="1"/>
+              <a:t>Antworten</a:t>
+            </a:r>
+            <a:r>
+              <a:rPr lang="en-US" dirty="0"/>
+              <a:t>:</a:t>
+            </a:r>
+          </a:p>
+          <a:p>
+            <a:pPr lvl="1"/>
+            <a:r>
+              <a:rPr lang="en-US" dirty="0">
+                <a:hlinkClick r:id="rId3"/>
+              </a:rPr>
+              <a:t>https://stackoverflow.com/questions/tagged/android</a:t>
+            </a:r>
+            <a:endParaRPr lang="en-US" dirty="0"/>
+          </a:p>
+          <a:p>
+            <a:r>
+              <a:rPr lang="en-US" dirty="0"/>
+              <a:t>Tutorial (Buch):</a:t>
+            </a:r>
+          </a:p>
+          <a:p>
+            <a:pPr lvl="1"/>
+            <a:r>
+              <a:rPr lang="en-US" dirty="0">
+                <a:hlinkClick r:id="rId4"/>
+              </a:rPr>
+              <a:t>https://www.uni-trier.de/fileadmin/urt/doku/android/android.pdf</a:t>
+            </a:r>
+            <a:endParaRPr lang="en-US" dirty="0"/>
+          </a:p>
+          <a:p>
+            <a:r>
+              <a:rPr lang="en-US" dirty="0"/>
+              <a:t>Tutorial (Online):</a:t>
+            </a:r>
+          </a:p>
+          <a:p>
+            <a:pPr lvl="1"/>
+            <a:r>
+              <a:rPr lang="en-US" dirty="0">
+                <a:hlinkClick r:id="rId5"/>
+              </a:rPr>
+              <a:t>https://www.tutorialspoint.com/android/</a:t>
+            </a:r>
+            <a:endParaRPr lang="en-US" dirty="0"/>
+          </a:p>
+          <a:p>
+            <a:pPr lvl="1"/>
+            <a:endParaRPr lang="en-US" dirty="0"/>
+          </a:p>
+          <a:p>
+            <a:endParaRPr lang="en-US" dirty="0"/>
+          </a:p>
+        </p:txBody>
+      </p:sp>
+    </p:spTree>
+    <p:extLst>
+      <p:ext uri="{BB962C8B-B14F-4D97-AF65-F5344CB8AC3E}">
+        <p14:creationId xmlns:p14="http://schemas.microsoft.com/office/powerpoint/2010/main" val="2230104365"/>
+      </p:ext>
+    </p:extLst>
+  </p:cSld>
+  <p:clrMapOvr>
+    <a:masterClrMapping/>
+  </p:clrMapOvr>
+</p:sld>
+</file>
+
 <file path=ppt/slides/slide3.xml><?xml version="1.0" encoding="utf-8"?>
 <p:sld xmlns:a="http://schemas.openxmlformats.org/drawingml/2006/main" xmlns:r="http://schemas.openxmlformats.org/officeDocument/2006/relationships" xmlns:p="http://schemas.openxmlformats.org/presentationml/2006/main">
   <p:cSld>
@@ -6765,6 +6998,34 @@
           </a:p>
           <a:p>
             <a:r>
+              <a:rPr lang="en-US" dirty="0"/>
+              <a:t>Wie </a:t>
+            </a:r>
+            <a:r>
+              <a:rPr lang="en-US" dirty="0" err="1"/>
+              <a:t>spielen</a:t>
+            </a:r>
+            <a:r>
+              <a:rPr lang="en-US" dirty="0"/>
+              <a:t> XML und Java </a:t>
+            </a:r>
+            <a:r>
+              <a:rPr lang="en-US" dirty="0" err="1"/>
+              <a:t>zusammen</a:t>
+            </a:r>
+            <a:r>
+              <a:rPr lang="en-US" dirty="0"/>
+              <a:t>?</a:t>
+            </a:r>
+          </a:p>
+          <a:p>
+            <a:pPr marL="0" indent="0">
+              <a:buNone/>
+            </a:pPr>
+            <a:endParaRPr lang="en-US" dirty="0"/>
+          </a:p>
+          <a:p>
+            <a:r>
               <a:rPr lang="en-US" dirty="0" err="1"/>
               <a:t>Welche</a:t>
             </a:r>
@@ -6848,28 +7109,6 @@
           </a:p>
           <a:p>
             <a:endParaRPr lang="en-US" dirty="0"/>
-          </a:p>
-          <a:p>
-            <a:r>
-              <a:rPr lang="en-US" dirty="0"/>
-              <a:t>Wie </a:t>
-            </a:r>
-            <a:r>
-              <a:rPr lang="en-US" dirty="0" err="1"/>
-              <a:t>spielen</a:t>
-            </a:r>
-            <a:r>
-              <a:rPr lang="en-US" dirty="0"/>
-              <a:t> XML und Java </a:t>
-            </a:r>
-            <a:r>
-              <a:rPr lang="en-US" dirty="0" err="1"/>
-              <a:t>zusammen</a:t>
-            </a:r>
-            <a:r>
-              <a:rPr lang="en-US" dirty="0"/>
-              <a:t>?</a:t>
-            </a:r>
           </a:p>
         </p:txBody>
       </p:sp>
@@ -7908,7 +8147,7 @@
             <a:pPr lvl="1"/>
             <a:r>
               <a:rPr lang="en-US" dirty="0" err="1"/>
-              <a:t>Übersichtler</a:t>
+              <a:t>Übersichtlicher</a:t>
             </a:r>
             <a:endParaRPr lang="en-US" dirty="0"/>
           </a:p>

</xml_diff>